<commit_message>
Updated List of Questions
</commit_message>
<xml_diff>
--- a/IRB/InPersonFlier.pptx
+++ b/IRB/InPersonFlier.pptx
@@ -2,18 +2,18 @@
 <file path=ppt/presentation.xml><?xml version="1.0" encoding="utf-8"?>
 <p:presentation xmlns:a="http://schemas.openxmlformats.org/drawingml/2006/main" xmlns:r="http://schemas.openxmlformats.org/officeDocument/2006/relationships" xmlns:p="http://schemas.openxmlformats.org/presentationml/2006/main" saveSubsetFonts="1">
   <p:sldMasterIdLst>
-    <p:sldMasterId id="2147483648" r:id="rId1"/>
+    <p:sldMasterId id="2147483660" r:id="rId1"/>
   </p:sldMasterIdLst>
   <p:sldIdLst>
     <p:sldId id="256" r:id="rId2"/>
   </p:sldIdLst>
-  <p:sldSz cx="6858000" cy="12192000"/>
+  <p:sldSz cx="7772400" cy="10058400"/>
   <p:notesSz cx="6858000" cy="9144000"/>
   <p:defaultTextStyle>
     <a:defPPr>
       <a:defRPr lang="en-US"/>
     </a:defPPr>
-    <a:lvl1pPr marL="0" algn="l" defTabSz="914400" rtl="0" eaLnBrk="1" latinLnBrk="0" hangingPunct="1">
+    <a:lvl1pPr marL="0" algn="l" defTabSz="457200" rtl="0" eaLnBrk="1" latinLnBrk="0" hangingPunct="1">
       <a:defRPr sz="1800" kern="1200">
         <a:solidFill>
           <a:schemeClr val="tx1"/>
@@ -23,7 +23,7 @@
         <a:cs typeface="+mn-cs"/>
       </a:defRPr>
     </a:lvl1pPr>
-    <a:lvl2pPr marL="457200" algn="l" defTabSz="914400" rtl="0" eaLnBrk="1" latinLnBrk="0" hangingPunct="1">
+    <a:lvl2pPr marL="457200" algn="l" defTabSz="457200" rtl="0" eaLnBrk="1" latinLnBrk="0" hangingPunct="1">
       <a:defRPr sz="1800" kern="1200">
         <a:solidFill>
           <a:schemeClr val="tx1"/>
@@ -33,7 +33,7 @@
         <a:cs typeface="+mn-cs"/>
       </a:defRPr>
     </a:lvl2pPr>
-    <a:lvl3pPr marL="914400" algn="l" defTabSz="914400" rtl="0" eaLnBrk="1" latinLnBrk="0" hangingPunct="1">
+    <a:lvl3pPr marL="914400" algn="l" defTabSz="457200" rtl="0" eaLnBrk="1" latinLnBrk="0" hangingPunct="1">
       <a:defRPr sz="1800" kern="1200">
         <a:solidFill>
           <a:schemeClr val="tx1"/>
@@ -43,7 +43,7 @@
         <a:cs typeface="+mn-cs"/>
       </a:defRPr>
     </a:lvl3pPr>
-    <a:lvl4pPr marL="1371600" algn="l" defTabSz="914400" rtl="0" eaLnBrk="1" latinLnBrk="0" hangingPunct="1">
+    <a:lvl4pPr marL="1371600" algn="l" defTabSz="457200" rtl="0" eaLnBrk="1" latinLnBrk="0" hangingPunct="1">
       <a:defRPr sz="1800" kern="1200">
         <a:solidFill>
           <a:schemeClr val="tx1"/>
@@ -53,7 +53,7 @@
         <a:cs typeface="+mn-cs"/>
       </a:defRPr>
     </a:lvl4pPr>
-    <a:lvl5pPr marL="1828800" algn="l" defTabSz="914400" rtl="0" eaLnBrk="1" latinLnBrk="0" hangingPunct="1">
+    <a:lvl5pPr marL="1828800" algn="l" defTabSz="457200" rtl="0" eaLnBrk="1" latinLnBrk="0" hangingPunct="1">
       <a:defRPr sz="1800" kern="1200">
         <a:solidFill>
           <a:schemeClr val="tx1"/>
@@ -63,7 +63,7 @@
         <a:cs typeface="+mn-cs"/>
       </a:defRPr>
     </a:lvl5pPr>
-    <a:lvl6pPr marL="2286000" algn="l" defTabSz="914400" rtl="0" eaLnBrk="1" latinLnBrk="0" hangingPunct="1">
+    <a:lvl6pPr marL="2286000" algn="l" defTabSz="457200" rtl="0" eaLnBrk="1" latinLnBrk="0" hangingPunct="1">
       <a:defRPr sz="1800" kern="1200">
         <a:solidFill>
           <a:schemeClr val="tx1"/>
@@ -73,7 +73,7 @@
         <a:cs typeface="+mn-cs"/>
       </a:defRPr>
     </a:lvl6pPr>
-    <a:lvl7pPr marL="2743200" algn="l" defTabSz="914400" rtl="0" eaLnBrk="1" latinLnBrk="0" hangingPunct="1">
+    <a:lvl7pPr marL="2743200" algn="l" defTabSz="457200" rtl="0" eaLnBrk="1" latinLnBrk="0" hangingPunct="1">
       <a:defRPr sz="1800" kern="1200">
         <a:solidFill>
           <a:schemeClr val="tx1"/>
@@ -83,7 +83,7 @@
         <a:cs typeface="+mn-cs"/>
       </a:defRPr>
     </a:lvl7pPr>
-    <a:lvl8pPr marL="3200400" algn="l" defTabSz="914400" rtl="0" eaLnBrk="1" latinLnBrk="0" hangingPunct="1">
+    <a:lvl8pPr marL="3200400" algn="l" defTabSz="457200" rtl="0" eaLnBrk="1" latinLnBrk="0" hangingPunct="1">
       <a:defRPr sz="1800" kern="1200">
         <a:solidFill>
           <a:schemeClr val="tx1"/>
@@ -93,7 +93,7 @@
         <a:cs typeface="+mn-cs"/>
       </a:defRPr>
     </a:lvl8pPr>
-    <a:lvl9pPr marL="3657600" algn="l" defTabSz="914400" rtl="0" eaLnBrk="1" latinLnBrk="0" hangingPunct="1">
+    <a:lvl9pPr marL="3657600" algn="l" defTabSz="457200" rtl="0" eaLnBrk="1" latinLnBrk="0" hangingPunct="1">
       <a:defRPr sz="1800" kern="1200">
         <a:solidFill>
           <a:schemeClr val="tx1"/>
@@ -104,6 +104,11 @@
       </a:defRPr>
     </a:lvl9pPr>
   </p:defaultTextStyle>
+  <p:extLst>
+    <p:ext uri="{EFAFB233-063F-42B5-8137-9DF3F51BA10A}">
+      <p15:sldGuideLst xmlns:p15="http://schemas.microsoft.com/office/powerpoint/2012/main"/>
+    </p:ext>
+  </p:extLst>
 </p:presentation>
 </file>
 
@@ -120,12 +125,12 @@
   <pc:docChgLst>
     <pc:chgData name="David Rosenberg" userId="233858652_tp_box_2" providerId="OAuth2" clId="{E5F62BD0-CF07-4A81-8D24-F29F204C7907}"/>
     <pc:docChg chg="undo custSel addSld modSld">
-      <pc:chgData name="David Rosenberg" userId="233858652_tp_box_2" providerId="OAuth2" clId="{E5F62BD0-CF07-4A81-8D24-F29F204C7907}" dt="2026-01-23T22:29:53.974" v="784" actId="692"/>
+      <pc:chgData name="David Rosenberg" userId="233858652_tp_box_2" providerId="OAuth2" clId="{E5F62BD0-CF07-4A81-8D24-F29F204C7907}" dt="2026-01-23T22:52:57.444" v="966" actId="1035"/>
       <pc:docMkLst>
         <pc:docMk/>
       </pc:docMkLst>
       <pc:sldChg chg="addSp delSp modSp new mod setBg">
-        <pc:chgData name="David Rosenberg" userId="233858652_tp_box_2" providerId="OAuth2" clId="{E5F62BD0-CF07-4A81-8D24-F29F204C7907}" dt="2026-01-23T22:29:53.974" v="784" actId="692"/>
+        <pc:chgData name="David Rosenberg" userId="233858652_tp_box_2" providerId="OAuth2" clId="{E5F62BD0-CF07-4A81-8D24-F29F204C7907}" dt="2026-01-23T22:52:57.444" v="966" actId="1035"/>
         <pc:sldMkLst>
           <pc:docMk/>
           <pc:sldMk cId="1979127427" sldId="256"/>
@@ -147,7 +152,7 @@
           </ac:spMkLst>
         </pc:spChg>
         <pc:spChg chg="add mod">
-          <ac:chgData name="David Rosenberg" userId="233858652_tp_box_2" providerId="OAuth2" clId="{E5F62BD0-CF07-4A81-8D24-F29F204C7907}" dt="2026-01-23T22:29:53.974" v="784" actId="692"/>
+          <ac:chgData name="David Rosenberg" userId="233858652_tp_box_2" providerId="OAuth2" clId="{E5F62BD0-CF07-4A81-8D24-F29F204C7907}" dt="2026-01-23T22:50:50.986" v="902" actId="14100"/>
           <ac:spMkLst>
             <pc:docMk/>
             <pc:sldMk cId="1979127427" sldId="256"/>
@@ -155,7 +160,7 @@
           </ac:spMkLst>
         </pc:spChg>
         <pc:spChg chg="add mod">
-          <ac:chgData name="David Rosenberg" userId="233858652_tp_box_2" providerId="OAuth2" clId="{E5F62BD0-CF07-4A81-8D24-F29F204C7907}" dt="2026-01-23T22:27:44.463" v="775" actId="14100"/>
+          <ac:chgData name="David Rosenberg" userId="233858652_tp_box_2" providerId="OAuth2" clId="{E5F62BD0-CF07-4A81-8D24-F29F204C7907}" dt="2026-01-23T22:51:03.849" v="905" actId="1036"/>
           <ac:spMkLst>
             <pc:docMk/>
             <pc:sldMk cId="1979127427" sldId="256"/>
@@ -163,7 +168,7 @@
           </ac:spMkLst>
         </pc:spChg>
         <pc:spChg chg="add mod">
-          <ac:chgData name="David Rosenberg" userId="233858652_tp_box_2" providerId="OAuth2" clId="{E5F62BD0-CF07-4A81-8D24-F29F204C7907}" dt="2026-01-23T22:28:11.432" v="779" actId="1035"/>
+          <ac:chgData name="David Rosenberg" userId="233858652_tp_box_2" providerId="OAuth2" clId="{E5F62BD0-CF07-4A81-8D24-F29F204C7907}" dt="2026-01-23T22:52:57.444" v="966" actId="1035"/>
           <ac:spMkLst>
             <pc:docMk/>
             <pc:sldMk cId="1979127427" sldId="256"/>
@@ -171,7 +176,7 @@
           </ac:spMkLst>
         </pc:spChg>
         <pc:spChg chg="add mod">
-          <ac:chgData name="David Rosenberg" userId="233858652_tp_box_2" providerId="OAuth2" clId="{E5F62BD0-CF07-4A81-8D24-F29F204C7907}" dt="2026-01-23T22:28:24.183" v="780" actId="554"/>
+          <ac:chgData name="David Rosenberg" userId="233858652_tp_box_2" providerId="OAuth2" clId="{E5F62BD0-CF07-4A81-8D24-F29F204C7907}" dt="2026-01-23T22:52:29.702" v="961" actId="20577"/>
           <ac:spMkLst>
             <pc:docMk/>
             <pc:sldMk cId="1979127427" sldId="256"/>
@@ -179,7 +184,7 @@
           </ac:spMkLst>
         </pc:spChg>
         <pc:spChg chg="add mod">
-          <ac:chgData name="David Rosenberg" userId="233858652_tp_box_2" providerId="OAuth2" clId="{E5F62BD0-CF07-4A81-8D24-F29F204C7907}" dt="2026-01-23T22:21:40.425" v="640" actId="12788"/>
+          <ac:chgData name="David Rosenberg" userId="233858652_tp_box_2" providerId="OAuth2" clId="{E5F62BD0-CF07-4A81-8D24-F29F204C7907}" dt="2026-01-23T22:51:10.418" v="908" actId="1036"/>
           <ac:spMkLst>
             <pc:docMk/>
             <pc:sldMk cId="1979127427" sldId="256"/>
@@ -187,7 +192,7 @@
           </ac:spMkLst>
         </pc:spChg>
         <pc:spChg chg="add mod">
-          <ac:chgData name="David Rosenberg" userId="233858652_tp_box_2" providerId="OAuth2" clId="{E5F62BD0-CF07-4A81-8D24-F29F204C7907}" dt="2026-01-23T22:28:24.183" v="780" actId="554"/>
+          <ac:chgData name="David Rosenberg" userId="233858652_tp_box_2" providerId="OAuth2" clId="{E5F62BD0-CF07-4A81-8D24-F29F204C7907}" dt="2026-01-23T22:50:43.583" v="901" actId="1035"/>
           <ac:spMkLst>
             <pc:docMk/>
             <pc:sldMk cId="1979127427" sldId="256"/>
@@ -195,7 +200,7 @@
           </ac:spMkLst>
         </pc:spChg>
         <pc:picChg chg="add mod">
-          <ac:chgData name="David Rosenberg" userId="233858652_tp_box_2" providerId="OAuth2" clId="{E5F62BD0-CF07-4A81-8D24-F29F204C7907}" dt="2026-01-23T22:21:40.425" v="640" actId="12788"/>
+          <ac:chgData name="David Rosenberg" userId="233858652_tp_box_2" providerId="OAuth2" clId="{E5F62BD0-CF07-4A81-8D24-F29F204C7907}" dt="2026-01-23T22:51:28.124" v="925" actId="1036"/>
           <ac:picMkLst>
             <pc:docMk/>
             <pc:sldMk cId="1979127427" sldId="256"/>
@@ -211,7 +216,7 @@
           </ac:picMkLst>
         </pc:picChg>
         <pc:picChg chg="add mod">
-          <ac:chgData name="David Rosenberg" userId="233858652_tp_box_2" providerId="OAuth2" clId="{E5F62BD0-CF07-4A81-8D24-F29F204C7907}" dt="2026-01-23T22:24:00.218" v="703" actId="1035"/>
+          <ac:chgData name="David Rosenberg" userId="233858652_tp_box_2" providerId="OAuth2" clId="{E5F62BD0-CF07-4A81-8D24-F29F204C7907}" dt="2026-01-23T22:51:16.516" v="917" actId="1036"/>
           <ac:picMkLst>
             <pc:docMk/>
             <pc:sldMk cId="1979127427" sldId="256"/>
@@ -219,7 +224,7 @@
           </ac:picMkLst>
         </pc:picChg>
         <pc:picChg chg="add mod">
-          <ac:chgData name="David Rosenberg" userId="233858652_tp_box_2" providerId="OAuth2" clId="{E5F62BD0-CF07-4A81-8D24-F29F204C7907}" dt="2026-01-23T22:27:07.111" v="770" actId="1038"/>
+          <ac:chgData name="David Rosenberg" userId="233858652_tp_box_2" providerId="OAuth2" clId="{E5F62BD0-CF07-4A81-8D24-F29F204C7907}" dt="2026-01-23T22:50:43.583" v="901" actId="1035"/>
           <ac:picMkLst>
             <pc:docMk/>
             <pc:sldMk cId="1979127427" sldId="256"/>
@@ -251,13 +256,7 @@
       </p:grpSpPr>
       <p:sp>
         <p:nvSpPr>
-          <p:cNvPr id="2" name="Title 1">
-            <a:extLst>
-              <a:ext uri="{FF2B5EF4-FFF2-40B4-BE49-F238E27FC236}">
-                <a16:creationId xmlns:a16="http://schemas.microsoft.com/office/drawing/2014/main" id="{83F69E90-7982-AE26-0289-2DFA82C9EDBC}"/>
-              </a:ext>
-            </a:extLst>
-          </p:cNvPr>
+          <p:cNvPr id="2" name="Title 1"/>
           <p:cNvSpPr>
             <a:spLocks noGrp="1"/>
           </p:cNvSpPr>
@@ -267,15 +266,15 @@
         </p:nvSpPr>
         <p:spPr>
           <a:xfrm>
-            <a:off x="857250" y="1995312"/>
-            <a:ext cx="5143500" cy="4244622"/>
+            <a:off x="582930" y="1646133"/>
+            <a:ext cx="6606540" cy="3501813"/>
           </a:xfrm>
         </p:spPr>
         <p:txBody>
           <a:bodyPr anchor="b"/>
           <a:lstStyle>
             <a:lvl1pPr algn="ctr">
-              <a:defRPr sz="6000"/>
+              <a:defRPr sz="5100"/>
             </a:lvl1pPr>
           </a:lstStyle>
           <a:p>
@@ -283,18 +282,13 @@
               <a:rPr lang="en-US"/>
               <a:t>Click to edit Master title style</a:t>
             </a:r>
-          </a:p>
-        </p:txBody>
-      </p:sp>
-      <p:sp>
-        <p:nvSpPr>
-          <p:cNvPr id="3" name="Subtitle 2">
-            <a:extLst>
-              <a:ext uri="{FF2B5EF4-FFF2-40B4-BE49-F238E27FC236}">
-                <a16:creationId xmlns:a16="http://schemas.microsoft.com/office/drawing/2014/main" id="{450B16C0-FF62-A200-44C5-57040110E95F}"/>
-              </a:ext>
-            </a:extLst>
-          </p:cNvPr>
+            <a:endParaRPr lang="en-US" dirty="0"/>
+          </a:p>
+        </p:txBody>
+      </p:sp>
+      <p:sp>
+        <p:nvSpPr>
+          <p:cNvPr id="3" name="Subtitle 2"/>
           <p:cNvSpPr>
             <a:spLocks noGrp="1"/>
           </p:cNvSpPr>
@@ -304,8 +298,8 @@
         </p:nvSpPr>
         <p:spPr>
           <a:xfrm>
-            <a:off x="857250" y="6403623"/>
-            <a:ext cx="5143500" cy="2943577"/>
+            <a:off x="971550" y="5282989"/>
+            <a:ext cx="5829300" cy="2428451"/>
           </a:xfrm>
         </p:spPr>
         <p:txBody>
@@ -313,39 +307,39 @@
           <a:lstStyle>
             <a:lvl1pPr marL="0" indent="0" algn="ctr">
               <a:buNone/>
-              <a:defRPr sz="2400"/>
+              <a:defRPr sz="2040"/>
             </a:lvl1pPr>
-            <a:lvl2pPr marL="457200" indent="0" algn="ctr">
-              <a:buNone/>
-              <a:defRPr sz="2000"/>
+            <a:lvl2pPr marL="388620" indent="0" algn="ctr">
+              <a:buNone/>
+              <a:defRPr sz="1700"/>
             </a:lvl2pPr>
-            <a:lvl3pPr marL="914400" indent="0" algn="ctr">
-              <a:buNone/>
-              <a:defRPr sz="1800"/>
+            <a:lvl3pPr marL="777240" indent="0" algn="ctr">
+              <a:buNone/>
+              <a:defRPr sz="1530"/>
             </a:lvl3pPr>
-            <a:lvl4pPr marL="1371600" indent="0" algn="ctr">
-              <a:buNone/>
-              <a:defRPr sz="1600"/>
+            <a:lvl4pPr marL="1165860" indent="0" algn="ctr">
+              <a:buNone/>
+              <a:defRPr sz="1360"/>
             </a:lvl4pPr>
-            <a:lvl5pPr marL="1828800" indent="0" algn="ctr">
-              <a:buNone/>
-              <a:defRPr sz="1600"/>
+            <a:lvl5pPr marL="1554480" indent="0" algn="ctr">
+              <a:buNone/>
+              <a:defRPr sz="1360"/>
             </a:lvl5pPr>
-            <a:lvl6pPr marL="2286000" indent="0" algn="ctr">
-              <a:buNone/>
-              <a:defRPr sz="1600"/>
+            <a:lvl6pPr marL="1943100" indent="0" algn="ctr">
+              <a:buNone/>
+              <a:defRPr sz="1360"/>
             </a:lvl6pPr>
-            <a:lvl7pPr marL="2743200" indent="0" algn="ctr">
-              <a:buNone/>
-              <a:defRPr sz="1600"/>
+            <a:lvl7pPr marL="2331720" indent="0" algn="ctr">
+              <a:buNone/>
+              <a:defRPr sz="1360"/>
             </a:lvl7pPr>
-            <a:lvl8pPr marL="3200400" indent="0" algn="ctr">
-              <a:buNone/>
-              <a:defRPr sz="1600"/>
+            <a:lvl8pPr marL="2720340" indent="0" algn="ctr">
+              <a:buNone/>
+              <a:defRPr sz="1360"/>
             </a:lvl8pPr>
-            <a:lvl9pPr marL="3657600" indent="0" algn="ctr">
-              <a:buNone/>
-              <a:defRPr sz="1600"/>
+            <a:lvl9pPr marL="3108960" indent="0" algn="ctr">
+              <a:buNone/>
+              <a:defRPr sz="1360"/>
             </a:lvl9pPr>
           </a:lstStyle>
           <a:p>
@@ -353,18 +347,13 @@
               <a:rPr lang="en-US"/>
               <a:t>Click to edit Master subtitle style</a:t>
             </a:r>
-          </a:p>
-        </p:txBody>
-      </p:sp>
-      <p:sp>
-        <p:nvSpPr>
-          <p:cNvPr id="4" name="Date Placeholder 3">
-            <a:extLst>
-              <a:ext uri="{FF2B5EF4-FFF2-40B4-BE49-F238E27FC236}">
-                <a16:creationId xmlns:a16="http://schemas.microsoft.com/office/drawing/2014/main" id="{02A1A22E-D7BC-1344-3347-816143F5CD0C}"/>
-              </a:ext>
-            </a:extLst>
-          </p:cNvPr>
+            <a:endParaRPr lang="en-US" dirty="0"/>
+          </a:p>
+        </p:txBody>
+      </p:sp>
+      <p:sp>
+        <p:nvSpPr>
+          <p:cNvPr id="4" name="Date Placeholder 3"/>
           <p:cNvSpPr>
             <a:spLocks noGrp="1"/>
           </p:cNvSpPr>
@@ -387,13 +376,7 @@
       </p:sp>
       <p:sp>
         <p:nvSpPr>
-          <p:cNvPr id="5" name="Footer Placeholder 4">
-            <a:extLst>
-              <a:ext uri="{FF2B5EF4-FFF2-40B4-BE49-F238E27FC236}">
-                <a16:creationId xmlns:a16="http://schemas.microsoft.com/office/drawing/2014/main" id="{6470EDD8-F266-A399-F7F8-9726F9BFDF16}"/>
-              </a:ext>
-            </a:extLst>
-          </p:cNvPr>
+          <p:cNvPr id="5" name="Footer Placeholder 4"/>
           <p:cNvSpPr>
             <a:spLocks noGrp="1"/>
           </p:cNvSpPr>
@@ -412,13 +395,7 @@
       </p:sp>
       <p:sp>
         <p:nvSpPr>
-          <p:cNvPr id="6" name="Slide Number Placeholder 5">
-            <a:extLst>
-              <a:ext uri="{FF2B5EF4-FFF2-40B4-BE49-F238E27FC236}">
-                <a16:creationId xmlns:a16="http://schemas.microsoft.com/office/drawing/2014/main" id="{F1C0A524-CFF6-5DA6-DF35-C614921AC06B}"/>
-              </a:ext>
-            </a:extLst>
-          </p:cNvPr>
+          <p:cNvPr id="6" name="Slide Number Placeholder 5"/>
           <p:cNvSpPr>
             <a:spLocks noGrp="1"/>
           </p:cNvSpPr>
@@ -442,7 +419,7 @@
     </p:spTree>
     <p:extLst>
       <p:ext uri="{BB962C8B-B14F-4D97-AF65-F5344CB8AC3E}">
-        <p14:creationId xmlns:p14="http://schemas.microsoft.com/office/powerpoint/2010/main" val="2884555803"/>
+        <p14:creationId xmlns:p14="http://schemas.microsoft.com/office/powerpoint/2010/main" val="2558891505"/>
       </p:ext>
     </p:extLst>
   </p:cSld>
@@ -471,13 +448,7 @@
       </p:grpSpPr>
       <p:sp>
         <p:nvSpPr>
-          <p:cNvPr id="2" name="Title 1">
-            <a:extLst>
-              <a:ext uri="{FF2B5EF4-FFF2-40B4-BE49-F238E27FC236}">
-                <a16:creationId xmlns:a16="http://schemas.microsoft.com/office/drawing/2014/main" id="{185C600E-7850-4189-7A13-4C13BFE2FFCD}"/>
-              </a:ext>
-            </a:extLst>
-          </p:cNvPr>
+          <p:cNvPr id="2" name="Title 1"/>
           <p:cNvSpPr>
             <a:spLocks noGrp="1"/>
           </p:cNvSpPr>
@@ -494,18 +465,13 @@
               <a:rPr lang="en-US"/>
               <a:t>Click to edit Master title style</a:t>
             </a:r>
-          </a:p>
-        </p:txBody>
-      </p:sp>
-      <p:sp>
-        <p:nvSpPr>
-          <p:cNvPr id="3" name="Vertical Text Placeholder 2">
-            <a:extLst>
-              <a:ext uri="{FF2B5EF4-FFF2-40B4-BE49-F238E27FC236}">
-                <a16:creationId xmlns:a16="http://schemas.microsoft.com/office/drawing/2014/main" id="{1239F0F7-7984-314D-1E3C-7F40F2E88822}"/>
-              </a:ext>
-            </a:extLst>
-          </p:cNvPr>
+            <a:endParaRPr lang="en-US" dirty="0"/>
+          </a:p>
+        </p:txBody>
+      </p:sp>
+      <p:sp>
+        <p:nvSpPr>
+          <p:cNvPr id="3" name="Vertical Text Placeholder 2"/>
           <p:cNvSpPr>
             <a:spLocks noGrp="1"/>
           </p:cNvSpPr>
@@ -551,18 +517,13 @@
               <a:rPr lang="en-US"/>
               <a:t>Fifth level</a:t>
             </a:r>
-          </a:p>
-        </p:txBody>
-      </p:sp>
-      <p:sp>
-        <p:nvSpPr>
-          <p:cNvPr id="4" name="Date Placeholder 3">
-            <a:extLst>
-              <a:ext uri="{FF2B5EF4-FFF2-40B4-BE49-F238E27FC236}">
-                <a16:creationId xmlns:a16="http://schemas.microsoft.com/office/drawing/2014/main" id="{3E853D25-3B94-236D-8755-5E50EC2D1F26}"/>
-              </a:ext>
-            </a:extLst>
-          </p:cNvPr>
+            <a:endParaRPr lang="en-US" dirty="0"/>
+          </a:p>
+        </p:txBody>
+      </p:sp>
+      <p:sp>
+        <p:nvSpPr>
+          <p:cNvPr id="4" name="Date Placeholder 3"/>
           <p:cNvSpPr>
             <a:spLocks noGrp="1"/>
           </p:cNvSpPr>
@@ -585,13 +546,7 @@
       </p:sp>
       <p:sp>
         <p:nvSpPr>
-          <p:cNvPr id="5" name="Footer Placeholder 4">
-            <a:extLst>
-              <a:ext uri="{FF2B5EF4-FFF2-40B4-BE49-F238E27FC236}">
-                <a16:creationId xmlns:a16="http://schemas.microsoft.com/office/drawing/2014/main" id="{DCF3FE8F-B950-C998-BC13-251CDBDD1DF5}"/>
-              </a:ext>
-            </a:extLst>
-          </p:cNvPr>
+          <p:cNvPr id="5" name="Footer Placeholder 4"/>
           <p:cNvSpPr>
             <a:spLocks noGrp="1"/>
           </p:cNvSpPr>
@@ -610,13 +565,7 @@
       </p:sp>
       <p:sp>
         <p:nvSpPr>
-          <p:cNvPr id="6" name="Slide Number Placeholder 5">
-            <a:extLst>
-              <a:ext uri="{FF2B5EF4-FFF2-40B4-BE49-F238E27FC236}">
-                <a16:creationId xmlns:a16="http://schemas.microsoft.com/office/drawing/2014/main" id="{89EFD38D-A6D1-200A-6590-658B58AA38DC}"/>
-              </a:ext>
-            </a:extLst>
-          </p:cNvPr>
+          <p:cNvPr id="6" name="Slide Number Placeholder 5"/>
           <p:cNvSpPr>
             <a:spLocks noGrp="1"/>
           </p:cNvSpPr>
@@ -640,7 +589,7 @@
     </p:spTree>
     <p:extLst>
       <p:ext uri="{BB962C8B-B14F-4D97-AF65-F5344CB8AC3E}">
-        <p14:creationId xmlns:p14="http://schemas.microsoft.com/office/powerpoint/2010/main" val="1748750312"/>
+        <p14:creationId xmlns:p14="http://schemas.microsoft.com/office/powerpoint/2010/main" val="3199108545"/>
       </p:ext>
     </p:extLst>
   </p:cSld>
@@ -669,13 +618,7 @@
       </p:grpSpPr>
       <p:sp>
         <p:nvSpPr>
-          <p:cNvPr id="2" name="Vertical Title 1">
-            <a:extLst>
-              <a:ext uri="{FF2B5EF4-FFF2-40B4-BE49-F238E27FC236}">
-                <a16:creationId xmlns:a16="http://schemas.microsoft.com/office/drawing/2014/main" id="{4167B910-0E09-8779-72B3-766894C43753}"/>
-              </a:ext>
-            </a:extLst>
-          </p:cNvPr>
+          <p:cNvPr id="2" name="Vertical Title 1"/>
           <p:cNvSpPr>
             <a:spLocks noGrp="1"/>
           </p:cNvSpPr>
@@ -685,8 +628,8 @@
         </p:nvSpPr>
         <p:spPr>
           <a:xfrm>
-            <a:off x="4907756" y="649111"/>
-            <a:ext cx="1478756" cy="10332156"/>
+            <a:off x="5562124" y="535517"/>
+            <a:ext cx="1675924" cy="8524029"/>
           </a:xfrm>
         </p:spPr>
         <p:txBody>
@@ -697,18 +640,13 @@
               <a:rPr lang="en-US"/>
               <a:t>Click to edit Master title style</a:t>
             </a:r>
-          </a:p>
-        </p:txBody>
-      </p:sp>
-      <p:sp>
-        <p:nvSpPr>
-          <p:cNvPr id="3" name="Vertical Text Placeholder 2">
-            <a:extLst>
-              <a:ext uri="{FF2B5EF4-FFF2-40B4-BE49-F238E27FC236}">
-                <a16:creationId xmlns:a16="http://schemas.microsoft.com/office/drawing/2014/main" id="{97EAC3B8-C827-A98B-490F-C8AAE265A734}"/>
-              </a:ext>
-            </a:extLst>
-          </p:cNvPr>
+            <a:endParaRPr lang="en-US" dirty="0"/>
+          </a:p>
+        </p:txBody>
+      </p:sp>
+      <p:sp>
+        <p:nvSpPr>
+          <p:cNvPr id="3" name="Vertical Text Placeholder 2"/>
           <p:cNvSpPr>
             <a:spLocks noGrp="1"/>
           </p:cNvSpPr>
@@ -718,8 +656,8 @@
         </p:nvSpPr>
         <p:spPr>
           <a:xfrm>
-            <a:off x="471487" y="649111"/>
-            <a:ext cx="4350544" cy="10332156"/>
+            <a:off x="534353" y="535517"/>
+            <a:ext cx="4930616" cy="8524029"/>
           </a:xfrm>
         </p:spPr>
         <p:txBody>
@@ -759,18 +697,13 @@
               <a:rPr lang="en-US"/>
               <a:t>Fifth level</a:t>
             </a:r>
-          </a:p>
-        </p:txBody>
-      </p:sp>
-      <p:sp>
-        <p:nvSpPr>
-          <p:cNvPr id="4" name="Date Placeholder 3">
-            <a:extLst>
-              <a:ext uri="{FF2B5EF4-FFF2-40B4-BE49-F238E27FC236}">
-                <a16:creationId xmlns:a16="http://schemas.microsoft.com/office/drawing/2014/main" id="{BC6AB77E-76B1-004D-9113-6C8CE4FE5557}"/>
-              </a:ext>
-            </a:extLst>
-          </p:cNvPr>
+            <a:endParaRPr lang="en-US" dirty="0"/>
+          </a:p>
+        </p:txBody>
+      </p:sp>
+      <p:sp>
+        <p:nvSpPr>
+          <p:cNvPr id="4" name="Date Placeholder 3"/>
           <p:cNvSpPr>
             <a:spLocks noGrp="1"/>
           </p:cNvSpPr>
@@ -793,13 +726,7 @@
       </p:sp>
       <p:sp>
         <p:nvSpPr>
-          <p:cNvPr id="5" name="Footer Placeholder 4">
-            <a:extLst>
-              <a:ext uri="{FF2B5EF4-FFF2-40B4-BE49-F238E27FC236}">
-                <a16:creationId xmlns:a16="http://schemas.microsoft.com/office/drawing/2014/main" id="{9706ED06-F540-2131-1F0C-CEE8A5E96E05}"/>
-              </a:ext>
-            </a:extLst>
-          </p:cNvPr>
+          <p:cNvPr id="5" name="Footer Placeholder 4"/>
           <p:cNvSpPr>
             <a:spLocks noGrp="1"/>
           </p:cNvSpPr>
@@ -818,13 +745,7 @@
       </p:sp>
       <p:sp>
         <p:nvSpPr>
-          <p:cNvPr id="6" name="Slide Number Placeholder 5">
-            <a:extLst>
-              <a:ext uri="{FF2B5EF4-FFF2-40B4-BE49-F238E27FC236}">
-                <a16:creationId xmlns:a16="http://schemas.microsoft.com/office/drawing/2014/main" id="{3134DF3F-5700-4BFD-448E-9F15286AF7F4}"/>
-              </a:ext>
-            </a:extLst>
-          </p:cNvPr>
+          <p:cNvPr id="6" name="Slide Number Placeholder 5"/>
           <p:cNvSpPr>
             <a:spLocks noGrp="1"/>
           </p:cNvSpPr>
@@ -848,7 +769,7 @@
     </p:spTree>
     <p:extLst>
       <p:ext uri="{BB962C8B-B14F-4D97-AF65-F5344CB8AC3E}">
-        <p14:creationId xmlns:p14="http://schemas.microsoft.com/office/powerpoint/2010/main" val="2521894439"/>
+        <p14:creationId xmlns:p14="http://schemas.microsoft.com/office/powerpoint/2010/main" val="3915617406"/>
       </p:ext>
     </p:extLst>
   </p:cSld>
@@ -877,13 +798,7 @@
       </p:grpSpPr>
       <p:sp>
         <p:nvSpPr>
-          <p:cNvPr id="2" name="Title 1">
-            <a:extLst>
-              <a:ext uri="{FF2B5EF4-FFF2-40B4-BE49-F238E27FC236}">
-                <a16:creationId xmlns:a16="http://schemas.microsoft.com/office/drawing/2014/main" id="{9B5997B6-28D6-B11D-66F6-4D372DBE571F}"/>
-              </a:ext>
-            </a:extLst>
-          </p:cNvPr>
+          <p:cNvPr id="2" name="Title 1"/>
           <p:cNvSpPr>
             <a:spLocks noGrp="1"/>
           </p:cNvSpPr>
@@ -900,18 +815,13 @@
               <a:rPr lang="en-US"/>
               <a:t>Click to edit Master title style</a:t>
             </a:r>
-          </a:p>
-        </p:txBody>
-      </p:sp>
-      <p:sp>
-        <p:nvSpPr>
-          <p:cNvPr id="3" name="Content Placeholder 2">
-            <a:extLst>
-              <a:ext uri="{FF2B5EF4-FFF2-40B4-BE49-F238E27FC236}">
-                <a16:creationId xmlns:a16="http://schemas.microsoft.com/office/drawing/2014/main" id="{BA56F9A1-F6A7-1A6C-924D-4E3FAC40DA38}"/>
-              </a:ext>
-            </a:extLst>
-          </p:cNvPr>
+            <a:endParaRPr lang="en-US" dirty="0"/>
+          </a:p>
+        </p:txBody>
+      </p:sp>
+      <p:sp>
+        <p:nvSpPr>
+          <p:cNvPr id="3" name="Content Placeholder 2"/>
           <p:cNvSpPr>
             <a:spLocks noGrp="1"/>
           </p:cNvSpPr>
@@ -957,18 +867,13 @@
               <a:rPr lang="en-US"/>
               <a:t>Fifth level</a:t>
             </a:r>
-          </a:p>
-        </p:txBody>
-      </p:sp>
-      <p:sp>
-        <p:nvSpPr>
-          <p:cNvPr id="4" name="Date Placeholder 3">
-            <a:extLst>
-              <a:ext uri="{FF2B5EF4-FFF2-40B4-BE49-F238E27FC236}">
-                <a16:creationId xmlns:a16="http://schemas.microsoft.com/office/drawing/2014/main" id="{0209550B-0A5D-FFDF-571E-432C1543FB7A}"/>
-              </a:ext>
-            </a:extLst>
-          </p:cNvPr>
+            <a:endParaRPr lang="en-US" dirty="0"/>
+          </a:p>
+        </p:txBody>
+      </p:sp>
+      <p:sp>
+        <p:nvSpPr>
+          <p:cNvPr id="4" name="Date Placeholder 3"/>
           <p:cNvSpPr>
             <a:spLocks noGrp="1"/>
           </p:cNvSpPr>
@@ -991,13 +896,7 @@
       </p:sp>
       <p:sp>
         <p:nvSpPr>
-          <p:cNvPr id="5" name="Footer Placeholder 4">
-            <a:extLst>
-              <a:ext uri="{FF2B5EF4-FFF2-40B4-BE49-F238E27FC236}">
-                <a16:creationId xmlns:a16="http://schemas.microsoft.com/office/drawing/2014/main" id="{026932B8-C650-76FA-3FCC-ED6C60DACF25}"/>
-              </a:ext>
-            </a:extLst>
-          </p:cNvPr>
+          <p:cNvPr id="5" name="Footer Placeholder 4"/>
           <p:cNvSpPr>
             <a:spLocks noGrp="1"/>
           </p:cNvSpPr>
@@ -1016,13 +915,7 @@
       </p:sp>
       <p:sp>
         <p:nvSpPr>
-          <p:cNvPr id="6" name="Slide Number Placeholder 5">
-            <a:extLst>
-              <a:ext uri="{FF2B5EF4-FFF2-40B4-BE49-F238E27FC236}">
-                <a16:creationId xmlns:a16="http://schemas.microsoft.com/office/drawing/2014/main" id="{8ACD36C5-BDE6-3EB8-EF9C-51E9D2109213}"/>
-              </a:ext>
-            </a:extLst>
-          </p:cNvPr>
+          <p:cNvPr id="6" name="Slide Number Placeholder 5"/>
           <p:cNvSpPr>
             <a:spLocks noGrp="1"/>
           </p:cNvSpPr>
@@ -1046,7 +939,7 @@
     </p:spTree>
     <p:extLst>
       <p:ext uri="{BB962C8B-B14F-4D97-AF65-F5344CB8AC3E}">
-        <p14:creationId xmlns:p14="http://schemas.microsoft.com/office/powerpoint/2010/main" val="3914517896"/>
+        <p14:creationId xmlns:p14="http://schemas.microsoft.com/office/powerpoint/2010/main" val="477152908"/>
       </p:ext>
     </p:extLst>
   </p:cSld>
@@ -1075,13 +968,7 @@
       </p:grpSpPr>
       <p:sp>
         <p:nvSpPr>
-          <p:cNvPr id="2" name="Title 1">
-            <a:extLst>
-              <a:ext uri="{FF2B5EF4-FFF2-40B4-BE49-F238E27FC236}">
-                <a16:creationId xmlns:a16="http://schemas.microsoft.com/office/drawing/2014/main" id="{9F178951-9A93-FE67-8230-84DD30044DFF}"/>
-              </a:ext>
-            </a:extLst>
-          </p:cNvPr>
+          <p:cNvPr id="2" name="Title 1"/>
           <p:cNvSpPr>
             <a:spLocks noGrp="1"/>
           </p:cNvSpPr>
@@ -1091,15 +978,15 @@
         </p:nvSpPr>
         <p:spPr>
           <a:xfrm>
-            <a:off x="467916" y="3039535"/>
-            <a:ext cx="5915025" cy="5071532"/>
+            <a:off x="530305" y="2507618"/>
+            <a:ext cx="6703695" cy="4184014"/>
           </a:xfrm>
         </p:spPr>
         <p:txBody>
           <a:bodyPr anchor="b"/>
           <a:lstStyle>
             <a:lvl1pPr>
-              <a:defRPr sz="6000"/>
+              <a:defRPr sz="5100"/>
             </a:lvl1pPr>
           </a:lstStyle>
           <a:p>
@@ -1107,18 +994,13 @@
               <a:rPr lang="en-US"/>
               <a:t>Click to edit Master title style</a:t>
             </a:r>
-          </a:p>
-        </p:txBody>
-      </p:sp>
-      <p:sp>
-        <p:nvSpPr>
-          <p:cNvPr id="3" name="Text Placeholder 2">
-            <a:extLst>
-              <a:ext uri="{FF2B5EF4-FFF2-40B4-BE49-F238E27FC236}">
-                <a16:creationId xmlns:a16="http://schemas.microsoft.com/office/drawing/2014/main" id="{E039E9F7-C2E6-DCC6-F112-C41D8574FEC9}"/>
-              </a:ext>
-            </a:extLst>
-          </p:cNvPr>
+            <a:endParaRPr lang="en-US" dirty="0"/>
+          </a:p>
+        </p:txBody>
+      </p:sp>
+      <p:sp>
+        <p:nvSpPr>
+          <p:cNvPr id="3" name="Text Placeholder 2"/>
           <p:cNvSpPr>
             <a:spLocks noGrp="1"/>
           </p:cNvSpPr>
@@ -1128,8 +1010,8 @@
         </p:nvSpPr>
         <p:spPr>
           <a:xfrm>
-            <a:off x="467916" y="8159046"/>
-            <a:ext cx="5915025" cy="2666999"/>
+            <a:off x="530305" y="6731215"/>
+            <a:ext cx="6703695" cy="2200274"/>
           </a:xfrm>
         </p:spPr>
         <p:txBody>
@@ -1137,7 +1019,7 @@
           <a:lstStyle>
             <a:lvl1pPr marL="0" indent="0">
               <a:buNone/>
-              <a:defRPr sz="2400">
+              <a:defRPr sz="2040">
                 <a:solidFill>
                   <a:schemeClr val="tx1">
                     <a:tint val="82000"/>
@@ -1145,9 +1027,9 @@
                 </a:solidFill>
               </a:defRPr>
             </a:lvl1pPr>
-            <a:lvl2pPr marL="457200" indent="0">
-              <a:buNone/>
-              <a:defRPr sz="2000">
+            <a:lvl2pPr marL="388620" indent="0">
+              <a:buNone/>
+              <a:defRPr sz="1700">
                 <a:solidFill>
                   <a:schemeClr val="tx1">
                     <a:tint val="82000"/>
@@ -1155,9 +1037,9 @@
                 </a:solidFill>
               </a:defRPr>
             </a:lvl2pPr>
-            <a:lvl3pPr marL="914400" indent="0">
-              <a:buNone/>
-              <a:defRPr sz="1800">
+            <a:lvl3pPr marL="777240" indent="0">
+              <a:buNone/>
+              <a:defRPr sz="1530">
                 <a:solidFill>
                   <a:schemeClr val="tx1">
                     <a:tint val="82000"/>
@@ -1165,9 +1047,9 @@
                 </a:solidFill>
               </a:defRPr>
             </a:lvl3pPr>
-            <a:lvl4pPr marL="1371600" indent="0">
-              <a:buNone/>
-              <a:defRPr sz="1600">
+            <a:lvl4pPr marL="1165860" indent="0">
+              <a:buNone/>
+              <a:defRPr sz="1360">
                 <a:solidFill>
                   <a:schemeClr val="tx1">
                     <a:tint val="82000"/>
@@ -1175,9 +1057,9 @@
                 </a:solidFill>
               </a:defRPr>
             </a:lvl4pPr>
-            <a:lvl5pPr marL="1828800" indent="0">
-              <a:buNone/>
-              <a:defRPr sz="1600">
+            <a:lvl5pPr marL="1554480" indent="0">
+              <a:buNone/>
+              <a:defRPr sz="1360">
                 <a:solidFill>
                   <a:schemeClr val="tx1">
                     <a:tint val="82000"/>
@@ -1185,9 +1067,9 @@
                 </a:solidFill>
               </a:defRPr>
             </a:lvl5pPr>
-            <a:lvl6pPr marL="2286000" indent="0">
-              <a:buNone/>
-              <a:defRPr sz="1600">
+            <a:lvl6pPr marL="1943100" indent="0">
+              <a:buNone/>
+              <a:defRPr sz="1360">
                 <a:solidFill>
                   <a:schemeClr val="tx1">
                     <a:tint val="82000"/>
@@ -1195,9 +1077,9 @@
                 </a:solidFill>
               </a:defRPr>
             </a:lvl6pPr>
-            <a:lvl7pPr marL="2743200" indent="0">
-              <a:buNone/>
-              <a:defRPr sz="1600">
+            <a:lvl7pPr marL="2331720" indent="0">
+              <a:buNone/>
+              <a:defRPr sz="1360">
                 <a:solidFill>
                   <a:schemeClr val="tx1">
                     <a:tint val="82000"/>
@@ -1205,9 +1087,9 @@
                 </a:solidFill>
               </a:defRPr>
             </a:lvl7pPr>
-            <a:lvl8pPr marL="3200400" indent="0">
-              <a:buNone/>
-              <a:defRPr sz="1600">
+            <a:lvl8pPr marL="2720340" indent="0">
+              <a:buNone/>
+              <a:defRPr sz="1360">
                 <a:solidFill>
                   <a:schemeClr val="tx1">
                     <a:tint val="82000"/>
@@ -1215,9 +1097,9 @@
                 </a:solidFill>
               </a:defRPr>
             </a:lvl8pPr>
-            <a:lvl9pPr marL="3657600" indent="0">
-              <a:buNone/>
-              <a:defRPr sz="1600">
+            <a:lvl9pPr marL="3108960" indent="0">
+              <a:buNone/>
+              <a:defRPr sz="1360">
                 <a:solidFill>
                   <a:schemeClr val="tx1">
                     <a:tint val="82000"/>
@@ -1237,13 +1119,7 @@
       </p:sp>
       <p:sp>
         <p:nvSpPr>
-          <p:cNvPr id="4" name="Date Placeholder 3">
-            <a:extLst>
-              <a:ext uri="{FF2B5EF4-FFF2-40B4-BE49-F238E27FC236}">
-                <a16:creationId xmlns:a16="http://schemas.microsoft.com/office/drawing/2014/main" id="{B07FFF59-94AE-B2B7-3249-33218BEEAE47}"/>
-              </a:ext>
-            </a:extLst>
-          </p:cNvPr>
+          <p:cNvPr id="4" name="Date Placeholder 3"/>
           <p:cNvSpPr>
             <a:spLocks noGrp="1"/>
           </p:cNvSpPr>
@@ -1266,13 +1142,7 @@
       </p:sp>
       <p:sp>
         <p:nvSpPr>
-          <p:cNvPr id="5" name="Footer Placeholder 4">
-            <a:extLst>
-              <a:ext uri="{FF2B5EF4-FFF2-40B4-BE49-F238E27FC236}">
-                <a16:creationId xmlns:a16="http://schemas.microsoft.com/office/drawing/2014/main" id="{07FD3E7C-9ECE-1321-DC70-2416C0467334}"/>
-              </a:ext>
-            </a:extLst>
-          </p:cNvPr>
+          <p:cNvPr id="5" name="Footer Placeholder 4"/>
           <p:cNvSpPr>
             <a:spLocks noGrp="1"/>
           </p:cNvSpPr>
@@ -1291,13 +1161,7 @@
       </p:sp>
       <p:sp>
         <p:nvSpPr>
-          <p:cNvPr id="6" name="Slide Number Placeholder 5">
-            <a:extLst>
-              <a:ext uri="{FF2B5EF4-FFF2-40B4-BE49-F238E27FC236}">
-                <a16:creationId xmlns:a16="http://schemas.microsoft.com/office/drawing/2014/main" id="{852B2BE6-49ED-9B46-052F-41275153B71A}"/>
-              </a:ext>
-            </a:extLst>
-          </p:cNvPr>
+          <p:cNvPr id="6" name="Slide Number Placeholder 5"/>
           <p:cNvSpPr>
             <a:spLocks noGrp="1"/>
           </p:cNvSpPr>
@@ -1321,7 +1185,7 @@
     </p:spTree>
     <p:extLst>
       <p:ext uri="{BB962C8B-B14F-4D97-AF65-F5344CB8AC3E}">
-        <p14:creationId xmlns:p14="http://schemas.microsoft.com/office/powerpoint/2010/main" val="3604003022"/>
+        <p14:creationId xmlns:p14="http://schemas.microsoft.com/office/powerpoint/2010/main" val="2605099312"/>
       </p:ext>
     </p:extLst>
   </p:cSld>
@@ -1350,13 +1214,7 @@
       </p:grpSpPr>
       <p:sp>
         <p:nvSpPr>
-          <p:cNvPr id="2" name="Title 1">
-            <a:extLst>
-              <a:ext uri="{FF2B5EF4-FFF2-40B4-BE49-F238E27FC236}">
-                <a16:creationId xmlns:a16="http://schemas.microsoft.com/office/drawing/2014/main" id="{4EE361DA-43E0-18CA-185C-73F10276F6AC}"/>
-              </a:ext>
-            </a:extLst>
-          </p:cNvPr>
+          <p:cNvPr id="2" name="Title 1"/>
           <p:cNvSpPr>
             <a:spLocks noGrp="1"/>
           </p:cNvSpPr>
@@ -1373,18 +1231,13 @@
               <a:rPr lang="en-US"/>
               <a:t>Click to edit Master title style</a:t>
             </a:r>
-          </a:p>
-        </p:txBody>
-      </p:sp>
-      <p:sp>
-        <p:nvSpPr>
-          <p:cNvPr id="3" name="Content Placeholder 2">
-            <a:extLst>
-              <a:ext uri="{FF2B5EF4-FFF2-40B4-BE49-F238E27FC236}">
-                <a16:creationId xmlns:a16="http://schemas.microsoft.com/office/drawing/2014/main" id="{7485CBF9-CC20-26D5-7630-D32D6034D368}"/>
-              </a:ext>
-            </a:extLst>
-          </p:cNvPr>
+            <a:endParaRPr lang="en-US" dirty="0"/>
+          </a:p>
+        </p:txBody>
+      </p:sp>
+      <p:sp>
+        <p:nvSpPr>
+          <p:cNvPr id="3" name="Content Placeholder 2"/>
           <p:cNvSpPr>
             <a:spLocks noGrp="1"/>
           </p:cNvSpPr>
@@ -1394,8 +1247,8 @@
         </p:nvSpPr>
         <p:spPr>
           <a:xfrm>
-            <a:off x="471488" y="3245556"/>
-            <a:ext cx="2914650" cy="7735712"/>
+            <a:off x="534353" y="2677584"/>
+            <a:ext cx="3303270" cy="6381962"/>
           </a:xfrm>
         </p:spPr>
         <p:txBody>
@@ -1435,18 +1288,13 @@
               <a:rPr lang="en-US"/>
               <a:t>Fifth level</a:t>
             </a:r>
-          </a:p>
-        </p:txBody>
-      </p:sp>
-      <p:sp>
-        <p:nvSpPr>
-          <p:cNvPr id="4" name="Content Placeholder 3">
-            <a:extLst>
-              <a:ext uri="{FF2B5EF4-FFF2-40B4-BE49-F238E27FC236}">
-                <a16:creationId xmlns:a16="http://schemas.microsoft.com/office/drawing/2014/main" id="{5E6F95C4-2A09-8E89-38F0-46B6E008A0EB}"/>
-              </a:ext>
-            </a:extLst>
-          </p:cNvPr>
+            <a:endParaRPr lang="en-US" dirty="0"/>
+          </a:p>
+        </p:txBody>
+      </p:sp>
+      <p:sp>
+        <p:nvSpPr>
+          <p:cNvPr id="4" name="Content Placeholder 3"/>
           <p:cNvSpPr>
             <a:spLocks noGrp="1"/>
           </p:cNvSpPr>
@@ -1456,8 +1304,8 @@
         </p:nvSpPr>
         <p:spPr>
           <a:xfrm>
-            <a:off x="3471863" y="3245556"/>
-            <a:ext cx="2914650" cy="7735712"/>
+            <a:off x="3934778" y="2677584"/>
+            <a:ext cx="3303270" cy="6381962"/>
           </a:xfrm>
         </p:spPr>
         <p:txBody>
@@ -1497,18 +1345,13 @@
               <a:rPr lang="en-US"/>
               <a:t>Fifth level</a:t>
             </a:r>
-          </a:p>
-        </p:txBody>
-      </p:sp>
-      <p:sp>
-        <p:nvSpPr>
-          <p:cNvPr id="5" name="Date Placeholder 4">
-            <a:extLst>
-              <a:ext uri="{FF2B5EF4-FFF2-40B4-BE49-F238E27FC236}">
-                <a16:creationId xmlns:a16="http://schemas.microsoft.com/office/drawing/2014/main" id="{8C2E16B6-2B16-D2B0-9360-13D78CFB4383}"/>
-              </a:ext>
-            </a:extLst>
-          </p:cNvPr>
+            <a:endParaRPr lang="en-US" dirty="0"/>
+          </a:p>
+        </p:txBody>
+      </p:sp>
+      <p:sp>
+        <p:nvSpPr>
+          <p:cNvPr id="5" name="Date Placeholder 4"/>
           <p:cNvSpPr>
             <a:spLocks noGrp="1"/>
           </p:cNvSpPr>
@@ -1531,13 +1374,7 @@
       </p:sp>
       <p:sp>
         <p:nvSpPr>
-          <p:cNvPr id="6" name="Footer Placeholder 5">
-            <a:extLst>
-              <a:ext uri="{FF2B5EF4-FFF2-40B4-BE49-F238E27FC236}">
-                <a16:creationId xmlns:a16="http://schemas.microsoft.com/office/drawing/2014/main" id="{B4215D70-FDC8-3953-E86E-88C7FF5F4092}"/>
-              </a:ext>
-            </a:extLst>
-          </p:cNvPr>
+          <p:cNvPr id="6" name="Footer Placeholder 5"/>
           <p:cNvSpPr>
             <a:spLocks noGrp="1"/>
           </p:cNvSpPr>
@@ -1556,13 +1393,7 @@
       </p:sp>
       <p:sp>
         <p:nvSpPr>
-          <p:cNvPr id="7" name="Slide Number Placeholder 6">
-            <a:extLst>
-              <a:ext uri="{FF2B5EF4-FFF2-40B4-BE49-F238E27FC236}">
-                <a16:creationId xmlns:a16="http://schemas.microsoft.com/office/drawing/2014/main" id="{48C9361C-0163-3972-11EB-D11C112C6CAD}"/>
-              </a:ext>
-            </a:extLst>
-          </p:cNvPr>
+          <p:cNvPr id="7" name="Slide Number Placeholder 6"/>
           <p:cNvSpPr>
             <a:spLocks noGrp="1"/>
           </p:cNvSpPr>
@@ -1586,7 +1417,7 @@
     </p:spTree>
     <p:extLst>
       <p:ext uri="{BB962C8B-B14F-4D97-AF65-F5344CB8AC3E}">
-        <p14:creationId xmlns:p14="http://schemas.microsoft.com/office/powerpoint/2010/main" val="1209489255"/>
+        <p14:creationId xmlns:p14="http://schemas.microsoft.com/office/powerpoint/2010/main" val="1239472398"/>
       </p:ext>
     </p:extLst>
   </p:cSld>
@@ -1615,13 +1446,7 @@
       </p:grpSpPr>
       <p:sp>
         <p:nvSpPr>
-          <p:cNvPr id="2" name="Title 1">
-            <a:extLst>
-              <a:ext uri="{FF2B5EF4-FFF2-40B4-BE49-F238E27FC236}">
-                <a16:creationId xmlns:a16="http://schemas.microsoft.com/office/drawing/2014/main" id="{B0B4585D-77BB-F96E-BFC8-91ED090320A6}"/>
-              </a:ext>
-            </a:extLst>
-          </p:cNvPr>
+          <p:cNvPr id="2" name="Title 1"/>
           <p:cNvSpPr>
             <a:spLocks noGrp="1"/>
           </p:cNvSpPr>
@@ -1631,8 +1456,8 @@
         </p:nvSpPr>
         <p:spPr>
           <a:xfrm>
-            <a:off x="472381" y="649112"/>
-            <a:ext cx="5915025" cy="2356556"/>
+            <a:off x="535365" y="535519"/>
+            <a:ext cx="6703695" cy="1944159"/>
           </a:xfrm>
         </p:spPr>
         <p:txBody>
@@ -1643,18 +1468,13 @@
               <a:rPr lang="en-US"/>
               <a:t>Click to edit Master title style</a:t>
             </a:r>
-          </a:p>
-        </p:txBody>
-      </p:sp>
-      <p:sp>
-        <p:nvSpPr>
-          <p:cNvPr id="3" name="Text Placeholder 2">
-            <a:extLst>
-              <a:ext uri="{FF2B5EF4-FFF2-40B4-BE49-F238E27FC236}">
-                <a16:creationId xmlns:a16="http://schemas.microsoft.com/office/drawing/2014/main" id="{E6E27F65-B11A-15F2-99D2-684262214A91}"/>
-              </a:ext>
-            </a:extLst>
-          </p:cNvPr>
+            <a:endParaRPr lang="en-US" dirty="0"/>
+          </a:p>
+        </p:txBody>
+      </p:sp>
+      <p:sp>
+        <p:nvSpPr>
+          <p:cNvPr id="3" name="Text Placeholder 2"/>
           <p:cNvSpPr>
             <a:spLocks noGrp="1"/>
           </p:cNvSpPr>
@@ -1664,8 +1484,8 @@
         </p:nvSpPr>
         <p:spPr>
           <a:xfrm>
-            <a:off x="472381" y="2988734"/>
-            <a:ext cx="2901255" cy="1464732"/>
+            <a:off x="535366" y="2465706"/>
+            <a:ext cx="3288089" cy="1208404"/>
           </a:xfrm>
         </p:spPr>
         <p:txBody>
@@ -1673,39 +1493,39 @@
           <a:lstStyle>
             <a:lvl1pPr marL="0" indent="0">
               <a:buNone/>
-              <a:defRPr sz="2400" b="1"/>
+              <a:defRPr sz="2040" b="1"/>
             </a:lvl1pPr>
-            <a:lvl2pPr marL="457200" indent="0">
-              <a:buNone/>
-              <a:defRPr sz="2000" b="1"/>
+            <a:lvl2pPr marL="388620" indent="0">
+              <a:buNone/>
+              <a:defRPr sz="1700" b="1"/>
             </a:lvl2pPr>
-            <a:lvl3pPr marL="914400" indent="0">
-              <a:buNone/>
-              <a:defRPr sz="1800" b="1"/>
+            <a:lvl3pPr marL="777240" indent="0">
+              <a:buNone/>
+              <a:defRPr sz="1530" b="1"/>
             </a:lvl3pPr>
-            <a:lvl4pPr marL="1371600" indent="0">
-              <a:buNone/>
-              <a:defRPr sz="1600" b="1"/>
+            <a:lvl4pPr marL="1165860" indent="0">
+              <a:buNone/>
+              <a:defRPr sz="1360" b="1"/>
             </a:lvl4pPr>
-            <a:lvl5pPr marL="1828800" indent="0">
-              <a:buNone/>
-              <a:defRPr sz="1600" b="1"/>
+            <a:lvl5pPr marL="1554480" indent="0">
+              <a:buNone/>
+              <a:defRPr sz="1360" b="1"/>
             </a:lvl5pPr>
-            <a:lvl6pPr marL="2286000" indent="0">
-              <a:buNone/>
-              <a:defRPr sz="1600" b="1"/>
+            <a:lvl6pPr marL="1943100" indent="0">
+              <a:buNone/>
+              <a:defRPr sz="1360" b="1"/>
             </a:lvl6pPr>
-            <a:lvl7pPr marL="2743200" indent="0">
-              <a:buNone/>
-              <a:defRPr sz="1600" b="1"/>
+            <a:lvl7pPr marL="2331720" indent="0">
+              <a:buNone/>
+              <a:defRPr sz="1360" b="1"/>
             </a:lvl7pPr>
-            <a:lvl8pPr marL="3200400" indent="0">
-              <a:buNone/>
-              <a:defRPr sz="1600" b="1"/>
+            <a:lvl8pPr marL="2720340" indent="0">
+              <a:buNone/>
+              <a:defRPr sz="1360" b="1"/>
             </a:lvl8pPr>
-            <a:lvl9pPr marL="3657600" indent="0">
-              <a:buNone/>
-              <a:defRPr sz="1600" b="1"/>
+            <a:lvl9pPr marL="3108960" indent="0">
+              <a:buNone/>
+              <a:defRPr sz="1360" b="1"/>
             </a:lvl9pPr>
           </a:lstStyle>
           <a:p>
@@ -1719,13 +1539,7 @@
       </p:sp>
       <p:sp>
         <p:nvSpPr>
-          <p:cNvPr id="4" name="Content Placeholder 3">
-            <a:extLst>
-              <a:ext uri="{FF2B5EF4-FFF2-40B4-BE49-F238E27FC236}">
-                <a16:creationId xmlns:a16="http://schemas.microsoft.com/office/drawing/2014/main" id="{7E55A0F3-DF00-5FFD-9AEE-FB5580AADFB3}"/>
-              </a:ext>
-            </a:extLst>
-          </p:cNvPr>
+          <p:cNvPr id="4" name="Content Placeholder 3"/>
           <p:cNvSpPr>
             <a:spLocks noGrp="1"/>
           </p:cNvSpPr>
@@ -1735,8 +1549,8 @@
         </p:nvSpPr>
         <p:spPr>
           <a:xfrm>
-            <a:off x="472381" y="4453467"/>
-            <a:ext cx="2901255" cy="6550379"/>
+            <a:off x="535366" y="3674110"/>
+            <a:ext cx="3288089" cy="5404062"/>
           </a:xfrm>
         </p:spPr>
         <p:txBody>
@@ -1776,18 +1590,13 @@
               <a:rPr lang="en-US"/>
               <a:t>Fifth level</a:t>
             </a:r>
-          </a:p>
-        </p:txBody>
-      </p:sp>
-      <p:sp>
-        <p:nvSpPr>
-          <p:cNvPr id="5" name="Text Placeholder 4">
-            <a:extLst>
-              <a:ext uri="{FF2B5EF4-FFF2-40B4-BE49-F238E27FC236}">
-                <a16:creationId xmlns:a16="http://schemas.microsoft.com/office/drawing/2014/main" id="{9AF325C0-3DE1-10BA-E896-023E30B9C122}"/>
-              </a:ext>
-            </a:extLst>
-          </p:cNvPr>
+            <a:endParaRPr lang="en-US" dirty="0"/>
+          </a:p>
+        </p:txBody>
+      </p:sp>
+      <p:sp>
+        <p:nvSpPr>
+          <p:cNvPr id="5" name="Text Placeholder 4"/>
           <p:cNvSpPr>
             <a:spLocks noGrp="1"/>
           </p:cNvSpPr>
@@ -1797,8 +1606,8 @@
         </p:nvSpPr>
         <p:spPr>
           <a:xfrm>
-            <a:off x="3471863" y="2988734"/>
-            <a:ext cx="2915543" cy="1464732"/>
+            <a:off x="3934778" y="2465706"/>
+            <a:ext cx="3304282" cy="1208404"/>
           </a:xfrm>
         </p:spPr>
         <p:txBody>
@@ -1806,39 +1615,39 @@
           <a:lstStyle>
             <a:lvl1pPr marL="0" indent="0">
               <a:buNone/>
-              <a:defRPr sz="2400" b="1"/>
+              <a:defRPr sz="2040" b="1"/>
             </a:lvl1pPr>
-            <a:lvl2pPr marL="457200" indent="0">
-              <a:buNone/>
-              <a:defRPr sz="2000" b="1"/>
+            <a:lvl2pPr marL="388620" indent="0">
+              <a:buNone/>
+              <a:defRPr sz="1700" b="1"/>
             </a:lvl2pPr>
-            <a:lvl3pPr marL="914400" indent="0">
-              <a:buNone/>
-              <a:defRPr sz="1800" b="1"/>
+            <a:lvl3pPr marL="777240" indent="0">
+              <a:buNone/>
+              <a:defRPr sz="1530" b="1"/>
             </a:lvl3pPr>
-            <a:lvl4pPr marL="1371600" indent="0">
-              <a:buNone/>
-              <a:defRPr sz="1600" b="1"/>
+            <a:lvl4pPr marL="1165860" indent="0">
+              <a:buNone/>
+              <a:defRPr sz="1360" b="1"/>
             </a:lvl4pPr>
-            <a:lvl5pPr marL="1828800" indent="0">
-              <a:buNone/>
-              <a:defRPr sz="1600" b="1"/>
+            <a:lvl5pPr marL="1554480" indent="0">
+              <a:buNone/>
+              <a:defRPr sz="1360" b="1"/>
             </a:lvl5pPr>
-            <a:lvl6pPr marL="2286000" indent="0">
-              <a:buNone/>
-              <a:defRPr sz="1600" b="1"/>
+            <a:lvl6pPr marL="1943100" indent="0">
+              <a:buNone/>
+              <a:defRPr sz="1360" b="1"/>
             </a:lvl6pPr>
-            <a:lvl7pPr marL="2743200" indent="0">
-              <a:buNone/>
-              <a:defRPr sz="1600" b="1"/>
+            <a:lvl7pPr marL="2331720" indent="0">
+              <a:buNone/>
+              <a:defRPr sz="1360" b="1"/>
             </a:lvl7pPr>
-            <a:lvl8pPr marL="3200400" indent="0">
-              <a:buNone/>
-              <a:defRPr sz="1600" b="1"/>
+            <a:lvl8pPr marL="2720340" indent="0">
+              <a:buNone/>
+              <a:defRPr sz="1360" b="1"/>
             </a:lvl8pPr>
-            <a:lvl9pPr marL="3657600" indent="0">
-              <a:buNone/>
-              <a:defRPr sz="1600" b="1"/>
+            <a:lvl9pPr marL="3108960" indent="0">
+              <a:buNone/>
+              <a:defRPr sz="1360" b="1"/>
             </a:lvl9pPr>
           </a:lstStyle>
           <a:p>
@@ -1852,13 +1661,7 @@
       </p:sp>
       <p:sp>
         <p:nvSpPr>
-          <p:cNvPr id="6" name="Content Placeholder 5">
-            <a:extLst>
-              <a:ext uri="{FF2B5EF4-FFF2-40B4-BE49-F238E27FC236}">
-                <a16:creationId xmlns:a16="http://schemas.microsoft.com/office/drawing/2014/main" id="{817C2544-B66F-A737-B8F6-D6F420E8F52E}"/>
-              </a:ext>
-            </a:extLst>
-          </p:cNvPr>
+          <p:cNvPr id="6" name="Content Placeholder 5"/>
           <p:cNvSpPr>
             <a:spLocks noGrp="1"/>
           </p:cNvSpPr>
@@ -1868,8 +1671,8 @@
         </p:nvSpPr>
         <p:spPr>
           <a:xfrm>
-            <a:off x="3471863" y="4453467"/>
-            <a:ext cx="2915543" cy="6550379"/>
+            <a:off x="3934778" y="3674110"/>
+            <a:ext cx="3304282" cy="5404062"/>
           </a:xfrm>
         </p:spPr>
         <p:txBody>
@@ -1909,18 +1712,13 @@
               <a:rPr lang="en-US"/>
               <a:t>Fifth level</a:t>
             </a:r>
-          </a:p>
-        </p:txBody>
-      </p:sp>
-      <p:sp>
-        <p:nvSpPr>
-          <p:cNvPr id="7" name="Date Placeholder 6">
-            <a:extLst>
-              <a:ext uri="{FF2B5EF4-FFF2-40B4-BE49-F238E27FC236}">
-                <a16:creationId xmlns:a16="http://schemas.microsoft.com/office/drawing/2014/main" id="{ACBC0909-C06B-237B-A271-6FB6A2C679E5}"/>
-              </a:ext>
-            </a:extLst>
-          </p:cNvPr>
+            <a:endParaRPr lang="en-US" dirty="0"/>
+          </a:p>
+        </p:txBody>
+      </p:sp>
+      <p:sp>
+        <p:nvSpPr>
+          <p:cNvPr id="7" name="Date Placeholder 6"/>
           <p:cNvSpPr>
             <a:spLocks noGrp="1"/>
           </p:cNvSpPr>
@@ -1943,13 +1741,7 @@
       </p:sp>
       <p:sp>
         <p:nvSpPr>
-          <p:cNvPr id="8" name="Footer Placeholder 7">
-            <a:extLst>
-              <a:ext uri="{FF2B5EF4-FFF2-40B4-BE49-F238E27FC236}">
-                <a16:creationId xmlns:a16="http://schemas.microsoft.com/office/drawing/2014/main" id="{8C651233-6D07-BD97-0132-7AA52AC088F1}"/>
-              </a:ext>
-            </a:extLst>
-          </p:cNvPr>
+          <p:cNvPr id="8" name="Footer Placeholder 7"/>
           <p:cNvSpPr>
             <a:spLocks noGrp="1"/>
           </p:cNvSpPr>
@@ -1968,13 +1760,7 @@
       </p:sp>
       <p:sp>
         <p:nvSpPr>
-          <p:cNvPr id="9" name="Slide Number Placeholder 8">
-            <a:extLst>
-              <a:ext uri="{FF2B5EF4-FFF2-40B4-BE49-F238E27FC236}">
-                <a16:creationId xmlns:a16="http://schemas.microsoft.com/office/drawing/2014/main" id="{26A5D133-E89A-02AF-5BAE-7D19E46D4CE4}"/>
-              </a:ext>
-            </a:extLst>
-          </p:cNvPr>
+          <p:cNvPr id="9" name="Slide Number Placeholder 8"/>
           <p:cNvSpPr>
             <a:spLocks noGrp="1"/>
           </p:cNvSpPr>
@@ -1998,7 +1784,7 @@
     </p:spTree>
     <p:extLst>
       <p:ext uri="{BB962C8B-B14F-4D97-AF65-F5344CB8AC3E}">
-        <p14:creationId xmlns:p14="http://schemas.microsoft.com/office/powerpoint/2010/main" val="998400481"/>
+        <p14:creationId xmlns:p14="http://schemas.microsoft.com/office/powerpoint/2010/main" val="565754340"/>
       </p:ext>
     </p:extLst>
   </p:cSld>
@@ -2027,13 +1813,7 @@
       </p:grpSpPr>
       <p:sp>
         <p:nvSpPr>
-          <p:cNvPr id="2" name="Title 1">
-            <a:extLst>
-              <a:ext uri="{FF2B5EF4-FFF2-40B4-BE49-F238E27FC236}">
-                <a16:creationId xmlns:a16="http://schemas.microsoft.com/office/drawing/2014/main" id="{539CB850-6416-57FF-9219-DA5BC85C5571}"/>
-              </a:ext>
-            </a:extLst>
-          </p:cNvPr>
+          <p:cNvPr id="2" name="Title 1"/>
           <p:cNvSpPr>
             <a:spLocks noGrp="1"/>
           </p:cNvSpPr>
@@ -2050,18 +1830,13 @@
               <a:rPr lang="en-US"/>
               <a:t>Click to edit Master title style</a:t>
             </a:r>
-          </a:p>
-        </p:txBody>
-      </p:sp>
-      <p:sp>
-        <p:nvSpPr>
-          <p:cNvPr id="3" name="Date Placeholder 2">
-            <a:extLst>
-              <a:ext uri="{FF2B5EF4-FFF2-40B4-BE49-F238E27FC236}">
-                <a16:creationId xmlns:a16="http://schemas.microsoft.com/office/drawing/2014/main" id="{F89F2491-EAE2-5E02-7121-3BDD40E13AAF}"/>
-              </a:ext>
-            </a:extLst>
-          </p:cNvPr>
+            <a:endParaRPr lang="en-US" dirty="0"/>
+          </a:p>
+        </p:txBody>
+      </p:sp>
+      <p:sp>
+        <p:nvSpPr>
+          <p:cNvPr id="3" name="Date Placeholder 2"/>
           <p:cNvSpPr>
             <a:spLocks noGrp="1"/>
           </p:cNvSpPr>
@@ -2084,13 +1859,7 @@
       </p:sp>
       <p:sp>
         <p:nvSpPr>
-          <p:cNvPr id="4" name="Footer Placeholder 3">
-            <a:extLst>
-              <a:ext uri="{FF2B5EF4-FFF2-40B4-BE49-F238E27FC236}">
-                <a16:creationId xmlns:a16="http://schemas.microsoft.com/office/drawing/2014/main" id="{81C0D669-7DA4-1F4A-BCF1-9F4A5E0EEEB2}"/>
-              </a:ext>
-            </a:extLst>
-          </p:cNvPr>
+          <p:cNvPr id="4" name="Footer Placeholder 3"/>
           <p:cNvSpPr>
             <a:spLocks noGrp="1"/>
           </p:cNvSpPr>
@@ -2109,13 +1878,7 @@
       </p:sp>
       <p:sp>
         <p:nvSpPr>
-          <p:cNvPr id="5" name="Slide Number Placeholder 4">
-            <a:extLst>
-              <a:ext uri="{FF2B5EF4-FFF2-40B4-BE49-F238E27FC236}">
-                <a16:creationId xmlns:a16="http://schemas.microsoft.com/office/drawing/2014/main" id="{F8FA5086-5E45-F2FA-C642-61FC4D74B379}"/>
-              </a:ext>
-            </a:extLst>
-          </p:cNvPr>
+          <p:cNvPr id="5" name="Slide Number Placeholder 4"/>
           <p:cNvSpPr>
             <a:spLocks noGrp="1"/>
           </p:cNvSpPr>
@@ -2139,7 +1902,7 @@
     </p:spTree>
     <p:extLst>
       <p:ext uri="{BB962C8B-B14F-4D97-AF65-F5344CB8AC3E}">
-        <p14:creationId xmlns:p14="http://schemas.microsoft.com/office/powerpoint/2010/main" val="1991188577"/>
+        <p14:creationId xmlns:p14="http://schemas.microsoft.com/office/powerpoint/2010/main" val="121222556"/>
       </p:ext>
     </p:extLst>
   </p:cSld>
@@ -2168,13 +1931,7 @@
       </p:grpSpPr>
       <p:sp>
         <p:nvSpPr>
-          <p:cNvPr id="2" name="Date Placeholder 1">
-            <a:extLst>
-              <a:ext uri="{FF2B5EF4-FFF2-40B4-BE49-F238E27FC236}">
-                <a16:creationId xmlns:a16="http://schemas.microsoft.com/office/drawing/2014/main" id="{EB6C87C4-4432-FD55-D839-1F216C834B09}"/>
-              </a:ext>
-            </a:extLst>
-          </p:cNvPr>
+          <p:cNvPr id="2" name="Date Placeholder 1"/>
           <p:cNvSpPr>
             <a:spLocks noGrp="1"/>
           </p:cNvSpPr>
@@ -2197,13 +1954,7 @@
       </p:sp>
       <p:sp>
         <p:nvSpPr>
-          <p:cNvPr id="3" name="Footer Placeholder 2">
-            <a:extLst>
-              <a:ext uri="{FF2B5EF4-FFF2-40B4-BE49-F238E27FC236}">
-                <a16:creationId xmlns:a16="http://schemas.microsoft.com/office/drawing/2014/main" id="{459C65C0-89D8-B27B-E5C5-07C95DB45846}"/>
-              </a:ext>
-            </a:extLst>
-          </p:cNvPr>
+          <p:cNvPr id="3" name="Footer Placeholder 2"/>
           <p:cNvSpPr>
             <a:spLocks noGrp="1"/>
           </p:cNvSpPr>
@@ -2222,13 +1973,7 @@
       </p:sp>
       <p:sp>
         <p:nvSpPr>
-          <p:cNvPr id="4" name="Slide Number Placeholder 3">
-            <a:extLst>
-              <a:ext uri="{FF2B5EF4-FFF2-40B4-BE49-F238E27FC236}">
-                <a16:creationId xmlns:a16="http://schemas.microsoft.com/office/drawing/2014/main" id="{73505CF8-9CF6-C01D-2B5B-84813AC27237}"/>
-              </a:ext>
-            </a:extLst>
-          </p:cNvPr>
+          <p:cNvPr id="4" name="Slide Number Placeholder 3"/>
           <p:cNvSpPr>
             <a:spLocks noGrp="1"/>
           </p:cNvSpPr>
@@ -2252,7 +1997,7 @@
     </p:spTree>
     <p:extLst>
       <p:ext uri="{BB962C8B-B14F-4D97-AF65-F5344CB8AC3E}">
-        <p14:creationId xmlns:p14="http://schemas.microsoft.com/office/powerpoint/2010/main" val="1407247014"/>
+        <p14:creationId xmlns:p14="http://schemas.microsoft.com/office/powerpoint/2010/main" val="2182886347"/>
       </p:ext>
     </p:extLst>
   </p:cSld>
@@ -2281,13 +2026,7 @@
       </p:grpSpPr>
       <p:sp>
         <p:nvSpPr>
-          <p:cNvPr id="2" name="Title 1">
-            <a:extLst>
-              <a:ext uri="{FF2B5EF4-FFF2-40B4-BE49-F238E27FC236}">
-                <a16:creationId xmlns:a16="http://schemas.microsoft.com/office/drawing/2014/main" id="{476F266A-2768-ED4A-1229-900FA8AA1103}"/>
-              </a:ext>
-            </a:extLst>
-          </p:cNvPr>
+          <p:cNvPr id="2" name="Title 1"/>
           <p:cNvSpPr>
             <a:spLocks noGrp="1"/>
           </p:cNvSpPr>
@@ -2297,15 +2036,15 @@
         </p:nvSpPr>
         <p:spPr>
           <a:xfrm>
-            <a:off x="472381" y="812800"/>
-            <a:ext cx="2211883" cy="2844800"/>
+            <a:off x="535365" y="670560"/>
+            <a:ext cx="2506801" cy="2346960"/>
           </a:xfrm>
         </p:spPr>
         <p:txBody>
           <a:bodyPr anchor="b"/>
           <a:lstStyle>
             <a:lvl1pPr>
-              <a:defRPr sz="3200"/>
+              <a:defRPr sz="2720"/>
             </a:lvl1pPr>
           </a:lstStyle>
           <a:p>
@@ -2313,18 +2052,13 @@
               <a:rPr lang="en-US"/>
               <a:t>Click to edit Master title style</a:t>
             </a:r>
-          </a:p>
-        </p:txBody>
-      </p:sp>
-      <p:sp>
-        <p:nvSpPr>
-          <p:cNvPr id="3" name="Content Placeholder 2">
-            <a:extLst>
-              <a:ext uri="{FF2B5EF4-FFF2-40B4-BE49-F238E27FC236}">
-                <a16:creationId xmlns:a16="http://schemas.microsoft.com/office/drawing/2014/main" id="{BC39C408-F21C-A2C9-5B92-C162D6D8A033}"/>
-              </a:ext>
-            </a:extLst>
-          </p:cNvPr>
+            <a:endParaRPr lang="en-US" dirty="0"/>
+          </a:p>
+        </p:txBody>
+      </p:sp>
+      <p:sp>
+        <p:nvSpPr>
+          <p:cNvPr id="3" name="Content Placeholder 2"/>
           <p:cNvSpPr>
             <a:spLocks noGrp="1"/>
           </p:cNvSpPr>
@@ -2334,39 +2068,39 @@
         </p:nvSpPr>
         <p:spPr>
           <a:xfrm>
-            <a:off x="2915543" y="1755423"/>
-            <a:ext cx="3471863" cy="8664222"/>
+            <a:off x="3304282" y="1448226"/>
+            <a:ext cx="3934778" cy="7147983"/>
           </a:xfrm>
         </p:spPr>
         <p:txBody>
           <a:bodyPr/>
           <a:lstStyle>
             <a:lvl1pPr>
-              <a:defRPr sz="3200"/>
+              <a:defRPr sz="2720"/>
             </a:lvl1pPr>
             <a:lvl2pPr>
-              <a:defRPr sz="2800"/>
+              <a:defRPr sz="2380"/>
             </a:lvl2pPr>
             <a:lvl3pPr>
-              <a:defRPr sz="2400"/>
+              <a:defRPr sz="2040"/>
             </a:lvl3pPr>
             <a:lvl4pPr>
-              <a:defRPr sz="2000"/>
+              <a:defRPr sz="1700"/>
             </a:lvl4pPr>
             <a:lvl5pPr>
-              <a:defRPr sz="2000"/>
+              <a:defRPr sz="1700"/>
             </a:lvl5pPr>
             <a:lvl6pPr>
-              <a:defRPr sz="2000"/>
+              <a:defRPr sz="1700"/>
             </a:lvl6pPr>
             <a:lvl7pPr>
-              <a:defRPr sz="2000"/>
+              <a:defRPr sz="1700"/>
             </a:lvl7pPr>
             <a:lvl8pPr>
-              <a:defRPr sz="2000"/>
+              <a:defRPr sz="1700"/>
             </a:lvl8pPr>
             <a:lvl9pPr>
-              <a:defRPr sz="2000"/>
+              <a:defRPr sz="1700"/>
             </a:lvl9pPr>
           </a:lstStyle>
           <a:p>
@@ -2403,18 +2137,13 @@
               <a:rPr lang="en-US"/>
               <a:t>Fifth level</a:t>
             </a:r>
-          </a:p>
-        </p:txBody>
-      </p:sp>
-      <p:sp>
-        <p:nvSpPr>
-          <p:cNvPr id="4" name="Text Placeholder 3">
-            <a:extLst>
-              <a:ext uri="{FF2B5EF4-FFF2-40B4-BE49-F238E27FC236}">
-                <a16:creationId xmlns:a16="http://schemas.microsoft.com/office/drawing/2014/main" id="{31822D6D-860D-D098-3A92-66ECD85513C3}"/>
-              </a:ext>
-            </a:extLst>
-          </p:cNvPr>
+            <a:endParaRPr lang="en-US" dirty="0"/>
+          </a:p>
+        </p:txBody>
+      </p:sp>
+      <p:sp>
+        <p:nvSpPr>
+          <p:cNvPr id="4" name="Text Placeholder 3"/>
           <p:cNvSpPr>
             <a:spLocks noGrp="1"/>
           </p:cNvSpPr>
@@ -2424,8 +2153,8 @@
         </p:nvSpPr>
         <p:spPr>
           <a:xfrm>
-            <a:off x="472381" y="3657600"/>
-            <a:ext cx="2211883" cy="6776156"/>
+            <a:off x="535365" y="3017520"/>
+            <a:ext cx="2506801" cy="5590329"/>
           </a:xfrm>
         </p:spPr>
         <p:txBody>
@@ -2433,39 +2162,39 @@
           <a:lstStyle>
             <a:lvl1pPr marL="0" indent="0">
               <a:buNone/>
-              <a:defRPr sz="1600"/>
+              <a:defRPr sz="1360"/>
             </a:lvl1pPr>
-            <a:lvl2pPr marL="457200" indent="0">
-              <a:buNone/>
-              <a:defRPr sz="1400"/>
+            <a:lvl2pPr marL="388620" indent="0">
+              <a:buNone/>
+              <a:defRPr sz="1190"/>
             </a:lvl2pPr>
-            <a:lvl3pPr marL="914400" indent="0">
-              <a:buNone/>
-              <a:defRPr sz="1200"/>
+            <a:lvl3pPr marL="777240" indent="0">
+              <a:buNone/>
+              <a:defRPr sz="1020"/>
             </a:lvl3pPr>
-            <a:lvl4pPr marL="1371600" indent="0">
-              <a:buNone/>
-              <a:defRPr sz="1000"/>
+            <a:lvl4pPr marL="1165860" indent="0">
+              <a:buNone/>
+              <a:defRPr sz="850"/>
             </a:lvl4pPr>
-            <a:lvl5pPr marL="1828800" indent="0">
-              <a:buNone/>
-              <a:defRPr sz="1000"/>
+            <a:lvl5pPr marL="1554480" indent="0">
+              <a:buNone/>
+              <a:defRPr sz="850"/>
             </a:lvl5pPr>
-            <a:lvl6pPr marL="2286000" indent="0">
-              <a:buNone/>
-              <a:defRPr sz="1000"/>
+            <a:lvl6pPr marL="1943100" indent="0">
+              <a:buNone/>
+              <a:defRPr sz="850"/>
             </a:lvl6pPr>
-            <a:lvl7pPr marL="2743200" indent="0">
-              <a:buNone/>
-              <a:defRPr sz="1000"/>
+            <a:lvl7pPr marL="2331720" indent="0">
+              <a:buNone/>
+              <a:defRPr sz="850"/>
             </a:lvl7pPr>
-            <a:lvl8pPr marL="3200400" indent="0">
-              <a:buNone/>
-              <a:defRPr sz="1000"/>
+            <a:lvl8pPr marL="2720340" indent="0">
+              <a:buNone/>
+              <a:defRPr sz="850"/>
             </a:lvl8pPr>
-            <a:lvl9pPr marL="3657600" indent="0">
-              <a:buNone/>
-              <a:defRPr sz="1000"/>
+            <a:lvl9pPr marL="3108960" indent="0">
+              <a:buNone/>
+              <a:defRPr sz="850"/>
             </a:lvl9pPr>
           </a:lstStyle>
           <a:p>
@@ -2479,13 +2208,7 @@
       </p:sp>
       <p:sp>
         <p:nvSpPr>
-          <p:cNvPr id="5" name="Date Placeholder 4">
-            <a:extLst>
-              <a:ext uri="{FF2B5EF4-FFF2-40B4-BE49-F238E27FC236}">
-                <a16:creationId xmlns:a16="http://schemas.microsoft.com/office/drawing/2014/main" id="{C7C9DCBF-40C4-E218-E844-800FAB7DBAE8}"/>
-              </a:ext>
-            </a:extLst>
-          </p:cNvPr>
+          <p:cNvPr id="5" name="Date Placeholder 4"/>
           <p:cNvSpPr>
             <a:spLocks noGrp="1"/>
           </p:cNvSpPr>
@@ -2508,13 +2231,7 @@
       </p:sp>
       <p:sp>
         <p:nvSpPr>
-          <p:cNvPr id="6" name="Footer Placeholder 5">
-            <a:extLst>
-              <a:ext uri="{FF2B5EF4-FFF2-40B4-BE49-F238E27FC236}">
-                <a16:creationId xmlns:a16="http://schemas.microsoft.com/office/drawing/2014/main" id="{4D5E17C4-DCA3-B2E2-914C-5CA893DC15B8}"/>
-              </a:ext>
-            </a:extLst>
-          </p:cNvPr>
+          <p:cNvPr id="6" name="Footer Placeholder 5"/>
           <p:cNvSpPr>
             <a:spLocks noGrp="1"/>
           </p:cNvSpPr>
@@ -2533,13 +2250,7 @@
       </p:sp>
       <p:sp>
         <p:nvSpPr>
-          <p:cNvPr id="7" name="Slide Number Placeholder 6">
-            <a:extLst>
-              <a:ext uri="{FF2B5EF4-FFF2-40B4-BE49-F238E27FC236}">
-                <a16:creationId xmlns:a16="http://schemas.microsoft.com/office/drawing/2014/main" id="{2363899A-B322-4365-FAEF-4635A1723D6B}"/>
-              </a:ext>
-            </a:extLst>
-          </p:cNvPr>
+          <p:cNvPr id="7" name="Slide Number Placeholder 6"/>
           <p:cNvSpPr>
             <a:spLocks noGrp="1"/>
           </p:cNvSpPr>
@@ -2563,7 +2274,7 @@
     </p:spTree>
     <p:extLst>
       <p:ext uri="{BB962C8B-B14F-4D97-AF65-F5344CB8AC3E}">
-        <p14:creationId xmlns:p14="http://schemas.microsoft.com/office/powerpoint/2010/main" val="2318551320"/>
+        <p14:creationId xmlns:p14="http://schemas.microsoft.com/office/powerpoint/2010/main" val="1179601830"/>
       </p:ext>
     </p:extLst>
   </p:cSld>
@@ -2592,13 +2303,7 @@
       </p:grpSpPr>
       <p:sp>
         <p:nvSpPr>
-          <p:cNvPr id="2" name="Title 1">
-            <a:extLst>
-              <a:ext uri="{FF2B5EF4-FFF2-40B4-BE49-F238E27FC236}">
-                <a16:creationId xmlns:a16="http://schemas.microsoft.com/office/drawing/2014/main" id="{DBB4A4F3-0F60-32D6-2482-43C3B8156CA6}"/>
-              </a:ext>
-            </a:extLst>
-          </p:cNvPr>
+          <p:cNvPr id="2" name="Title 1"/>
           <p:cNvSpPr>
             <a:spLocks noGrp="1"/>
           </p:cNvSpPr>
@@ -2608,15 +2313,15 @@
         </p:nvSpPr>
         <p:spPr>
           <a:xfrm>
-            <a:off x="472381" y="812800"/>
-            <a:ext cx="2211883" cy="2844800"/>
+            <a:off x="535365" y="670560"/>
+            <a:ext cx="2506801" cy="2346960"/>
           </a:xfrm>
         </p:spPr>
         <p:txBody>
           <a:bodyPr anchor="b"/>
           <a:lstStyle>
             <a:lvl1pPr>
-              <a:defRPr sz="3200"/>
+              <a:defRPr sz="2720"/>
             </a:lvl1pPr>
           </a:lstStyle>
           <a:p>
@@ -2624,20 +2329,15 @@
               <a:rPr lang="en-US"/>
               <a:t>Click to edit Master title style</a:t>
             </a:r>
-          </a:p>
-        </p:txBody>
-      </p:sp>
-      <p:sp>
-        <p:nvSpPr>
-          <p:cNvPr id="3" name="Picture Placeholder 2">
-            <a:extLst>
-              <a:ext uri="{FF2B5EF4-FFF2-40B4-BE49-F238E27FC236}">
-                <a16:creationId xmlns:a16="http://schemas.microsoft.com/office/drawing/2014/main" id="{AC971F72-42CA-4ADA-B43A-A2BC581AAC33}"/>
-              </a:ext>
-            </a:extLst>
-          </p:cNvPr>
-          <p:cNvSpPr>
-            <a:spLocks noGrp="1"/>
+            <a:endParaRPr lang="en-US" dirty="0"/>
+          </a:p>
+        </p:txBody>
+      </p:sp>
+      <p:sp>
+        <p:nvSpPr>
+          <p:cNvPr id="3" name="Picture Placeholder 2"/>
+          <p:cNvSpPr>
+            <a:spLocks noGrp="1" noChangeAspect="1"/>
           </p:cNvSpPr>
           <p:nvPr>
             <p:ph type="pic" idx="1"/>
@@ -2645,64 +2345,62 @@
         </p:nvSpPr>
         <p:spPr>
           <a:xfrm>
-            <a:off x="2915543" y="1755423"/>
-            <a:ext cx="3471863" cy="8664222"/>
+            <a:off x="3304282" y="1448226"/>
+            <a:ext cx="3934778" cy="7147983"/>
           </a:xfrm>
         </p:spPr>
         <p:txBody>
-          <a:bodyPr/>
+          <a:bodyPr anchor="t"/>
           <a:lstStyle>
             <a:lvl1pPr marL="0" indent="0">
               <a:buNone/>
-              <a:defRPr sz="3200"/>
+              <a:defRPr sz="2720"/>
             </a:lvl1pPr>
-            <a:lvl2pPr marL="457200" indent="0">
-              <a:buNone/>
-              <a:defRPr sz="2800"/>
+            <a:lvl2pPr marL="388620" indent="0">
+              <a:buNone/>
+              <a:defRPr sz="2380"/>
             </a:lvl2pPr>
-            <a:lvl3pPr marL="914400" indent="0">
-              <a:buNone/>
-              <a:defRPr sz="2400"/>
+            <a:lvl3pPr marL="777240" indent="0">
+              <a:buNone/>
+              <a:defRPr sz="2040"/>
             </a:lvl3pPr>
-            <a:lvl4pPr marL="1371600" indent="0">
-              <a:buNone/>
-              <a:defRPr sz="2000"/>
+            <a:lvl4pPr marL="1165860" indent="0">
+              <a:buNone/>
+              <a:defRPr sz="1700"/>
             </a:lvl4pPr>
-            <a:lvl5pPr marL="1828800" indent="0">
-              <a:buNone/>
-              <a:defRPr sz="2000"/>
+            <a:lvl5pPr marL="1554480" indent="0">
+              <a:buNone/>
+              <a:defRPr sz="1700"/>
             </a:lvl5pPr>
-            <a:lvl6pPr marL="2286000" indent="0">
-              <a:buNone/>
-              <a:defRPr sz="2000"/>
+            <a:lvl6pPr marL="1943100" indent="0">
+              <a:buNone/>
+              <a:defRPr sz="1700"/>
             </a:lvl6pPr>
-            <a:lvl7pPr marL="2743200" indent="0">
-              <a:buNone/>
-              <a:defRPr sz="2000"/>
+            <a:lvl7pPr marL="2331720" indent="0">
+              <a:buNone/>
+              <a:defRPr sz="1700"/>
             </a:lvl7pPr>
-            <a:lvl8pPr marL="3200400" indent="0">
-              <a:buNone/>
-              <a:defRPr sz="2000"/>
+            <a:lvl8pPr marL="2720340" indent="0">
+              <a:buNone/>
+              <a:defRPr sz="1700"/>
             </a:lvl8pPr>
-            <a:lvl9pPr marL="3657600" indent="0">
-              <a:buNone/>
-              <a:defRPr sz="2000"/>
+            <a:lvl9pPr marL="3108960" indent="0">
+              <a:buNone/>
+              <a:defRPr sz="1700"/>
             </a:lvl9pPr>
           </a:lstStyle>
           <a:p>
-            <a:endParaRPr lang="en-US"/>
-          </a:p>
-        </p:txBody>
-      </p:sp>
-      <p:sp>
-        <p:nvSpPr>
-          <p:cNvPr id="4" name="Text Placeholder 3">
-            <a:extLst>
-              <a:ext uri="{FF2B5EF4-FFF2-40B4-BE49-F238E27FC236}">
-                <a16:creationId xmlns:a16="http://schemas.microsoft.com/office/drawing/2014/main" id="{0D4E9E58-66E6-2875-C38B-2A0DDE1593A6}"/>
-              </a:ext>
-            </a:extLst>
-          </p:cNvPr>
+            <a:r>
+              <a:rPr lang="en-US"/>
+              <a:t>Click icon to add picture</a:t>
+            </a:r>
+            <a:endParaRPr lang="en-US" dirty="0"/>
+          </a:p>
+        </p:txBody>
+      </p:sp>
+      <p:sp>
+        <p:nvSpPr>
+          <p:cNvPr id="4" name="Text Placeholder 3"/>
           <p:cNvSpPr>
             <a:spLocks noGrp="1"/>
           </p:cNvSpPr>
@@ -2712,8 +2410,8 @@
         </p:nvSpPr>
         <p:spPr>
           <a:xfrm>
-            <a:off x="472381" y="3657600"/>
-            <a:ext cx="2211883" cy="6776156"/>
+            <a:off x="535365" y="3017520"/>
+            <a:ext cx="2506801" cy="5590329"/>
           </a:xfrm>
         </p:spPr>
         <p:txBody>
@@ -2721,39 +2419,39 @@
           <a:lstStyle>
             <a:lvl1pPr marL="0" indent="0">
               <a:buNone/>
-              <a:defRPr sz="1600"/>
+              <a:defRPr sz="1360"/>
             </a:lvl1pPr>
-            <a:lvl2pPr marL="457200" indent="0">
-              <a:buNone/>
-              <a:defRPr sz="1400"/>
+            <a:lvl2pPr marL="388620" indent="0">
+              <a:buNone/>
+              <a:defRPr sz="1190"/>
             </a:lvl2pPr>
-            <a:lvl3pPr marL="914400" indent="0">
-              <a:buNone/>
-              <a:defRPr sz="1200"/>
+            <a:lvl3pPr marL="777240" indent="0">
+              <a:buNone/>
+              <a:defRPr sz="1020"/>
             </a:lvl3pPr>
-            <a:lvl4pPr marL="1371600" indent="0">
-              <a:buNone/>
-              <a:defRPr sz="1000"/>
+            <a:lvl4pPr marL="1165860" indent="0">
+              <a:buNone/>
+              <a:defRPr sz="850"/>
             </a:lvl4pPr>
-            <a:lvl5pPr marL="1828800" indent="0">
-              <a:buNone/>
-              <a:defRPr sz="1000"/>
+            <a:lvl5pPr marL="1554480" indent="0">
+              <a:buNone/>
+              <a:defRPr sz="850"/>
             </a:lvl5pPr>
-            <a:lvl6pPr marL="2286000" indent="0">
-              <a:buNone/>
-              <a:defRPr sz="1000"/>
+            <a:lvl6pPr marL="1943100" indent="0">
+              <a:buNone/>
+              <a:defRPr sz="850"/>
             </a:lvl6pPr>
-            <a:lvl7pPr marL="2743200" indent="0">
-              <a:buNone/>
-              <a:defRPr sz="1000"/>
+            <a:lvl7pPr marL="2331720" indent="0">
+              <a:buNone/>
+              <a:defRPr sz="850"/>
             </a:lvl7pPr>
-            <a:lvl8pPr marL="3200400" indent="0">
-              <a:buNone/>
-              <a:defRPr sz="1000"/>
+            <a:lvl8pPr marL="2720340" indent="0">
+              <a:buNone/>
+              <a:defRPr sz="850"/>
             </a:lvl8pPr>
-            <a:lvl9pPr marL="3657600" indent="0">
-              <a:buNone/>
-              <a:defRPr sz="1000"/>
+            <a:lvl9pPr marL="3108960" indent="0">
+              <a:buNone/>
+              <a:defRPr sz="850"/>
             </a:lvl9pPr>
           </a:lstStyle>
           <a:p>
@@ -2767,13 +2465,7 @@
       </p:sp>
       <p:sp>
         <p:nvSpPr>
-          <p:cNvPr id="5" name="Date Placeholder 4">
-            <a:extLst>
-              <a:ext uri="{FF2B5EF4-FFF2-40B4-BE49-F238E27FC236}">
-                <a16:creationId xmlns:a16="http://schemas.microsoft.com/office/drawing/2014/main" id="{C50E86A1-BD29-5AEF-0222-8A449B54636E}"/>
-              </a:ext>
-            </a:extLst>
-          </p:cNvPr>
+          <p:cNvPr id="5" name="Date Placeholder 4"/>
           <p:cNvSpPr>
             <a:spLocks noGrp="1"/>
           </p:cNvSpPr>
@@ -2796,13 +2488,7 @@
       </p:sp>
       <p:sp>
         <p:nvSpPr>
-          <p:cNvPr id="6" name="Footer Placeholder 5">
-            <a:extLst>
-              <a:ext uri="{FF2B5EF4-FFF2-40B4-BE49-F238E27FC236}">
-                <a16:creationId xmlns:a16="http://schemas.microsoft.com/office/drawing/2014/main" id="{28EB4E93-FD9E-9F11-8164-E1F8827CB547}"/>
-              </a:ext>
-            </a:extLst>
-          </p:cNvPr>
+          <p:cNvPr id="6" name="Footer Placeholder 5"/>
           <p:cNvSpPr>
             <a:spLocks noGrp="1"/>
           </p:cNvSpPr>
@@ -2821,13 +2507,7 @@
       </p:sp>
       <p:sp>
         <p:nvSpPr>
-          <p:cNvPr id="7" name="Slide Number Placeholder 6">
-            <a:extLst>
-              <a:ext uri="{FF2B5EF4-FFF2-40B4-BE49-F238E27FC236}">
-                <a16:creationId xmlns:a16="http://schemas.microsoft.com/office/drawing/2014/main" id="{327836EA-0C9F-CC90-DA7F-EA6894F78DC7}"/>
-              </a:ext>
-            </a:extLst>
-          </p:cNvPr>
+          <p:cNvPr id="7" name="Slide Number Placeholder 6"/>
           <p:cNvSpPr>
             <a:spLocks noGrp="1"/>
           </p:cNvSpPr>
@@ -2851,7 +2531,7 @@
     </p:spTree>
     <p:extLst>
       <p:ext uri="{BB962C8B-B14F-4D97-AF65-F5344CB8AC3E}">
-        <p14:creationId xmlns:p14="http://schemas.microsoft.com/office/powerpoint/2010/main" val="191872966"/>
+        <p14:creationId xmlns:p14="http://schemas.microsoft.com/office/powerpoint/2010/main" val="3582983215"/>
       </p:ext>
     </p:extLst>
   </p:cSld>
@@ -2885,13 +2565,7 @@
       </p:grpSpPr>
       <p:sp>
         <p:nvSpPr>
-          <p:cNvPr id="2" name="Title Placeholder 1">
-            <a:extLst>
-              <a:ext uri="{FF2B5EF4-FFF2-40B4-BE49-F238E27FC236}">
-                <a16:creationId xmlns:a16="http://schemas.microsoft.com/office/drawing/2014/main" id="{A9E905EE-58FD-F8B9-D9D4-CAFA6CB2128F}"/>
-              </a:ext>
-            </a:extLst>
-          </p:cNvPr>
+          <p:cNvPr id="2" name="Title Placeholder 1"/>
           <p:cNvSpPr>
             <a:spLocks noGrp="1"/>
           </p:cNvSpPr>
@@ -2901,8 +2575,8 @@
         </p:nvSpPr>
         <p:spPr>
           <a:xfrm>
-            <a:off x="471488" y="649112"/>
-            <a:ext cx="5915025" cy="2356556"/>
+            <a:off x="534353" y="535519"/>
+            <a:ext cx="6703695" cy="1944159"/>
           </a:xfrm>
           <a:prstGeom prst="rect">
             <a:avLst/>
@@ -2918,18 +2592,13 @@
               <a:rPr lang="en-US"/>
               <a:t>Click to edit Master title style</a:t>
             </a:r>
-          </a:p>
-        </p:txBody>
-      </p:sp>
-      <p:sp>
-        <p:nvSpPr>
-          <p:cNvPr id="3" name="Text Placeholder 2">
-            <a:extLst>
-              <a:ext uri="{FF2B5EF4-FFF2-40B4-BE49-F238E27FC236}">
-                <a16:creationId xmlns:a16="http://schemas.microsoft.com/office/drawing/2014/main" id="{F1F844D9-B88F-1643-3416-1B3A73F0B17A}"/>
-              </a:ext>
-            </a:extLst>
-          </p:cNvPr>
+            <a:endParaRPr lang="en-US" dirty="0"/>
+          </a:p>
+        </p:txBody>
+      </p:sp>
+      <p:sp>
+        <p:nvSpPr>
+          <p:cNvPr id="3" name="Text Placeholder 2"/>
           <p:cNvSpPr>
             <a:spLocks noGrp="1"/>
           </p:cNvSpPr>
@@ -2939,8 +2608,8 @@
         </p:nvSpPr>
         <p:spPr>
           <a:xfrm>
-            <a:off x="471488" y="3245556"/>
-            <a:ext cx="5915025" cy="7735712"/>
+            <a:off x="534353" y="2677584"/>
+            <a:ext cx="6703695" cy="6381962"/>
           </a:xfrm>
           <a:prstGeom prst="rect">
             <a:avLst/>
@@ -2985,18 +2654,13 @@
               <a:rPr lang="en-US"/>
               <a:t>Fifth level</a:t>
             </a:r>
-          </a:p>
-        </p:txBody>
-      </p:sp>
-      <p:sp>
-        <p:nvSpPr>
-          <p:cNvPr id="4" name="Date Placeholder 3">
-            <a:extLst>
-              <a:ext uri="{FF2B5EF4-FFF2-40B4-BE49-F238E27FC236}">
-                <a16:creationId xmlns:a16="http://schemas.microsoft.com/office/drawing/2014/main" id="{C2D176BC-B01F-3A22-1CDE-A415057A050D}"/>
-              </a:ext>
-            </a:extLst>
-          </p:cNvPr>
+            <a:endParaRPr lang="en-US" dirty="0"/>
+          </a:p>
+        </p:txBody>
+      </p:sp>
+      <p:sp>
+        <p:nvSpPr>
+          <p:cNvPr id="4" name="Date Placeholder 3"/>
           <p:cNvSpPr>
             <a:spLocks noGrp="1"/>
           </p:cNvSpPr>
@@ -3006,8 +2670,8 @@
         </p:nvSpPr>
         <p:spPr>
           <a:xfrm>
-            <a:off x="471488" y="11300179"/>
-            <a:ext cx="1543050" cy="649111"/>
+            <a:off x="534353" y="9322649"/>
+            <a:ext cx="1748790" cy="535517"/>
           </a:xfrm>
           <a:prstGeom prst="rect">
             <a:avLst/>
@@ -3017,7 +2681,7 @@
           <a:bodyPr vert="horz" lIns="91440" tIns="45720" rIns="91440" bIns="45720" rtlCol="0" anchor="ctr"/>
           <a:lstStyle>
             <a:lvl1pPr algn="l">
-              <a:defRPr sz="1200">
+              <a:defRPr sz="1020">
                 <a:solidFill>
                   <a:schemeClr val="tx1">
                     <a:tint val="82000"/>
@@ -3037,13 +2701,7 @@
       </p:sp>
       <p:sp>
         <p:nvSpPr>
-          <p:cNvPr id="5" name="Footer Placeholder 4">
-            <a:extLst>
-              <a:ext uri="{FF2B5EF4-FFF2-40B4-BE49-F238E27FC236}">
-                <a16:creationId xmlns:a16="http://schemas.microsoft.com/office/drawing/2014/main" id="{6FDA7C8A-6B56-9C2C-FD1A-97A3BD250FCB}"/>
-              </a:ext>
-            </a:extLst>
-          </p:cNvPr>
+          <p:cNvPr id="5" name="Footer Placeholder 4"/>
           <p:cNvSpPr>
             <a:spLocks noGrp="1"/>
           </p:cNvSpPr>
@@ -3053,8 +2711,8 @@
         </p:nvSpPr>
         <p:spPr>
           <a:xfrm>
-            <a:off x="2271713" y="11300179"/>
-            <a:ext cx="2314575" cy="649111"/>
+            <a:off x="2574608" y="9322649"/>
+            <a:ext cx="2623185" cy="535517"/>
           </a:xfrm>
           <a:prstGeom prst="rect">
             <a:avLst/>
@@ -3064,7 +2722,7 @@
           <a:bodyPr vert="horz" lIns="91440" tIns="45720" rIns="91440" bIns="45720" rtlCol="0" anchor="ctr"/>
           <a:lstStyle>
             <a:lvl1pPr algn="ctr">
-              <a:defRPr sz="1200">
+              <a:defRPr sz="1020">
                 <a:solidFill>
                   <a:schemeClr val="tx1">
                     <a:tint val="82000"/>
@@ -3080,13 +2738,7 @@
       </p:sp>
       <p:sp>
         <p:nvSpPr>
-          <p:cNvPr id="6" name="Slide Number Placeholder 5">
-            <a:extLst>
-              <a:ext uri="{FF2B5EF4-FFF2-40B4-BE49-F238E27FC236}">
-                <a16:creationId xmlns:a16="http://schemas.microsoft.com/office/drawing/2014/main" id="{97C9D9E2-7C37-3166-A2C4-871FB1F298C6}"/>
-              </a:ext>
-            </a:extLst>
-          </p:cNvPr>
+          <p:cNvPr id="6" name="Slide Number Placeholder 5"/>
           <p:cNvSpPr>
             <a:spLocks noGrp="1"/>
           </p:cNvSpPr>
@@ -3096,8 +2748,8 @@
         </p:nvSpPr>
         <p:spPr>
           <a:xfrm>
-            <a:off x="4843463" y="11300179"/>
-            <a:ext cx="1543050" cy="649111"/>
+            <a:off x="5489258" y="9322649"/>
+            <a:ext cx="1748790" cy="535517"/>
           </a:xfrm>
           <a:prstGeom prst="rect">
             <a:avLst/>
@@ -3107,7 +2759,7 @@
           <a:bodyPr vert="horz" lIns="91440" tIns="45720" rIns="91440" bIns="45720" rtlCol="0" anchor="ctr"/>
           <a:lstStyle>
             <a:lvl1pPr algn="r">
-              <a:defRPr sz="1200">
+              <a:defRPr sz="1020">
                 <a:solidFill>
                   <a:schemeClr val="tx1">
                     <a:tint val="82000"/>
@@ -3128,27 +2780,27 @@
     </p:spTree>
     <p:extLst>
       <p:ext uri="{BB962C8B-B14F-4D97-AF65-F5344CB8AC3E}">
-        <p14:creationId xmlns:p14="http://schemas.microsoft.com/office/powerpoint/2010/main" val="3457079616"/>
+        <p14:creationId xmlns:p14="http://schemas.microsoft.com/office/powerpoint/2010/main" val="1182338788"/>
       </p:ext>
     </p:extLst>
   </p:cSld>
   <p:clrMap bg1="lt1" tx1="dk1" bg2="lt2" tx2="dk2" accent1="accent1" accent2="accent2" accent3="accent3" accent4="accent4" accent5="accent5" accent6="accent6" hlink="hlink" folHlink="folHlink"/>
   <p:sldLayoutIdLst>
-    <p:sldLayoutId id="2147483649" r:id="rId1"/>
-    <p:sldLayoutId id="2147483650" r:id="rId2"/>
-    <p:sldLayoutId id="2147483651" r:id="rId3"/>
-    <p:sldLayoutId id="2147483652" r:id="rId4"/>
-    <p:sldLayoutId id="2147483653" r:id="rId5"/>
-    <p:sldLayoutId id="2147483654" r:id="rId6"/>
-    <p:sldLayoutId id="2147483655" r:id="rId7"/>
-    <p:sldLayoutId id="2147483656" r:id="rId8"/>
-    <p:sldLayoutId id="2147483657" r:id="rId9"/>
-    <p:sldLayoutId id="2147483658" r:id="rId10"/>
-    <p:sldLayoutId id="2147483659" r:id="rId11"/>
+    <p:sldLayoutId id="2147483661" r:id="rId1"/>
+    <p:sldLayoutId id="2147483662" r:id="rId2"/>
+    <p:sldLayoutId id="2147483663" r:id="rId3"/>
+    <p:sldLayoutId id="2147483664" r:id="rId4"/>
+    <p:sldLayoutId id="2147483665" r:id="rId5"/>
+    <p:sldLayoutId id="2147483666" r:id="rId6"/>
+    <p:sldLayoutId id="2147483667" r:id="rId7"/>
+    <p:sldLayoutId id="2147483668" r:id="rId8"/>
+    <p:sldLayoutId id="2147483669" r:id="rId9"/>
+    <p:sldLayoutId id="2147483670" r:id="rId10"/>
+    <p:sldLayoutId id="2147483671" r:id="rId11"/>
   </p:sldLayoutIdLst>
   <p:txStyles>
     <p:titleStyle>
-      <a:lvl1pPr algn="l" defTabSz="914400" rtl="0" eaLnBrk="1" latinLnBrk="0" hangingPunct="1">
+      <a:lvl1pPr algn="l" defTabSz="777240" rtl="0" eaLnBrk="1" latinLnBrk="0" hangingPunct="1">
         <a:lnSpc>
           <a:spcPct val="90000"/>
         </a:lnSpc>
@@ -3156,7 +2808,7 @@
           <a:spcPct val="0"/>
         </a:spcBef>
         <a:buNone/>
-        <a:defRPr sz="4400" kern="1200">
+        <a:defRPr sz="3740" kern="1200">
           <a:solidFill>
             <a:schemeClr val="tx1"/>
           </a:solidFill>
@@ -3167,16 +2819,16 @@
       </a:lvl1pPr>
     </p:titleStyle>
     <p:bodyStyle>
-      <a:lvl1pPr marL="228600" indent="-228600" algn="l" defTabSz="914400" rtl="0" eaLnBrk="1" latinLnBrk="0" hangingPunct="1">
+      <a:lvl1pPr marL="194310" indent="-194310" algn="l" defTabSz="777240" rtl="0" eaLnBrk="1" latinLnBrk="0" hangingPunct="1">
         <a:lnSpc>
           <a:spcPct val="90000"/>
         </a:lnSpc>
         <a:spcBef>
-          <a:spcPts val="1000"/>
+          <a:spcPts val="850"/>
         </a:spcBef>
         <a:buFont typeface="Arial" panose="020B0604020202020204" pitchFamily="34" charset="0"/>
         <a:buChar char="•"/>
-        <a:defRPr sz="2800" kern="1200">
+        <a:defRPr sz="2380" kern="1200">
           <a:solidFill>
             <a:schemeClr val="tx1"/>
           </a:solidFill>
@@ -3185,16 +2837,16 @@
           <a:cs typeface="+mn-cs"/>
         </a:defRPr>
       </a:lvl1pPr>
-      <a:lvl2pPr marL="685800" indent="-228600" algn="l" defTabSz="914400" rtl="0" eaLnBrk="1" latinLnBrk="0" hangingPunct="1">
+      <a:lvl2pPr marL="582930" indent="-194310" algn="l" defTabSz="777240" rtl="0" eaLnBrk="1" latinLnBrk="0" hangingPunct="1">
         <a:lnSpc>
           <a:spcPct val="90000"/>
         </a:lnSpc>
         <a:spcBef>
-          <a:spcPts val="500"/>
+          <a:spcPts val="425"/>
         </a:spcBef>
         <a:buFont typeface="Arial" panose="020B0604020202020204" pitchFamily="34" charset="0"/>
         <a:buChar char="•"/>
-        <a:defRPr sz="2400" kern="1200">
+        <a:defRPr sz="2040" kern="1200">
           <a:solidFill>
             <a:schemeClr val="tx1"/>
           </a:solidFill>
@@ -3203,16 +2855,16 @@
           <a:cs typeface="+mn-cs"/>
         </a:defRPr>
       </a:lvl2pPr>
-      <a:lvl3pPr marL="1143000" indent="-228600" algn="l" defTabSz="914400" rtl="0" eaLnBrk="1" latinLnBrk="0" hangingPunct="1">
+      <a:lvl3pPr marL="971550" indent="-194310" algn="l" defTabSz="777240" rtl="0" eaLnBrk="1" latinLnBrk="0" hangingPunct="1">
         <a:lnSpc>
           <a:spcPct val="90000"/>
         </a:lnSpc>
         <a:spcBef>
-          <a:spcPts val="500"/>
+          <a:spcPts val="425"/>
         </a:spcBef>
         <a:buFont typeface="Arial" panose="020B0604020202020204" pitchFamily="34" charset="0"/>
         <a:buChar char="•"/>
-        <a:defRPr sz="2000" kern="1200">
+        <a:defRPr sz="1700" kern="1200">
           <a:solidFill>
             <a:schemeClr val="tx1"/>
           </a:solidFill>
@@ -3221,16 +2873,16 @@
           <a:cs typeface="+mn-cs"/>
         </a:defRPr>
       </a:lvl3pPr>
-      <a:lvl4pPr marL="1600200" indent="-228600" algn="l" defTabSz="914400" rtl="0" eaLnBrk="1" latinLnBrk="0" hangingPunct="1">
+      <a:lvl4pPr marL="1360170" indent="-194310" algn="l" defTabSz="777240" rtl="0" eaLnBrk="1" latinLnBrk="0" hangingPunct="1">
         <a:lnSpc>
           <a:spcPct val="90000"/>
         </a:lnSpc>
         <a:spcBef>
-          <a:spcPts val="500"/>
+          <a:spcPts val="425"/>
         </a:spcBef>
         <a:buFont typeface="Arial" panose="020B0604020202020204" pitchFamily="34" charset="0"/>
         <a:buChar char="•"/>
-        <a:defRPr sz="1800" kern="1200">
+        <a:defRPr sz="1530" kern="1200">
           <a:solidFill>
             <a:schemeClr val="tx1"/>
           </a:solidFill>
@@ -3239,16 +2891,16 @@
           <a:cs typeface="+mn-cs"/>
         </a:defRPr>
       </a:lvl4pPr>
-      <a:lvl5pPr marL="2057400" indent="-228600" algn="l" defTabSz="914400" rtl="0" eaLnBrk="1" latinLnBrk="0" hangingPunct="1">
+      <a:lvl5pPr marL="1748790" indent="-194310" algn="l" defTabSz="777240" rtl="0" eaLnBrk="1" latinLnBrk="0" hangingPunct="1">
         <a:lnSpc>
           <a:spcPct val="90000"/>
         </a:lnSpc>
         <a:spcBef>
-          <a:spcPts val="500"/>
+          <a:spcPts val="425"/>
         </a:spcBef>
         <a:buFont typeface="Arial" panose="020B0604020202020204" pitchFamily="34" charset="0"/>
         <a:buChar char="•"/>
-        <a:defRPr sz="1800" kern="1200">
+        <a:defRPr sz="1530" kern="1200">
           <a:solidFill>
             <a:schemeClr val="tx1"/>
           </a:solidFill>
@@ -3257,16 +2909,16 @@
           <a:cs typeface="+mn-cs"/>
         </a:defRPr>
       </a:lvl5pPr>
-      <a:lvl6pPr marL="2514600" indent="-228600" algn="l" defTabSz="914400" rtl="0" eaLnBrk="1" latinLnBrk="0" hangingPunct="1">
+      <a:lvl6pPr marL="2137410" indent="-194310" algn="l" defTabSz="777240" rtl="0" eaLnBrk="1" latinLnBrk="0" hangingPunct="1">
         <a:lnSpc>
           <a:spcPct val="90000"/>
         </a:lnSpc>
         <a:spcBef>
-          <a:spcPts val="500"/>
+          <a:spcPts val="425"/>
         </a:spcBef>
         <a:buFont typeface="Arial" panose="020B0604020202020204" pitchFamily="34" charset="0"/>
         <a:buChar char="•"/>
-        <a:defRPr sz="1800" kern="1200">
+        <a:defRPr sz="1530" kern="1200">
           <a:solidFill>
             <a:schemeClr val="tx1"/>
           </a:solidFill>
@@ -3275,16 +2927,16 @@
           <a:cs typeface="+mn-cs"/>
         </a:defRPr>
       </a:lvl6pPr>
-      <a:lvl7pPr marL="2971800" indent="-228600" algn="l" defTabSz="914400" rtl="0" eaLnBrk="1" latinLnBrk="0" hangingPunct="1">
+      <a:lvl7pPr marL="2526030" indent="-194310" algn="l" defTabSz="777240" rtl="0" eaLnBrk="1" latinLnBrk="0" hangingPunct="1">
         <a:lnSpc>
           <a:spcPct val="90000"/>
         </a:lnSpc>
         <a:spcBef>
-          <a:spcPts val="500"/>
+          <a:spcPts val="425"/>
         </a:spcBef>
         <a:buFont typeface="Arial" panose="020B0604020202020204" pitchFamily="34" charset="0"/>
         <a:buChar char="•"/>
-        <a:defRPr sz="1800" kern="1200">
+        <a:defRPr sz="1530" kern="1200">
           <a:solidFill>
             <a:schemeClr val="tx1"/>
           </a:solidFill>
@@ -3293,16 +2945,16 @@
           <a:cs typeface="+mn-cs"/>
         </a:defRPr>
       </a:lvl7pPr>
-      <a:lvl8pPr marL="3429000" indent="-228600" algn="l" defTabSz="914400" rtl="0" eaLnBrk="1" latinLnBrk="0" hangingPunct="1">
+      <a:lvl8pPr marL="2914650" indent="-194310" algn="l" defTabSz="777240" rtl="0" eaLnBrk="1" latinLnBrk="0" hangingPunct="1">
         <a:lnSpc>
           <a:spcPct val="90000"/>
         </a:lnSpc>
         <a:spcBef>
-          <a:spcPts val="500"/>
+          <a:spcPts val="425"/>
         </a:spcBef>
         <a:buFont typeface="Arial" panose="020B0604020202020204" pitchFamily="34" charset="0"/>
         <a:buChar char="•"/>
-        <a:defRPr sz="1800" kern="1200">
+        <a:defRPr sz="1530" kern="1200">
           <a:solidFill>
             <a:schemeClr val="tx1"/>
           </a:solidFill>
@@ -3311,16 +2963,16 @@
           <a:cs typeface="+mn-cs"/>
         </a:defRPr>
       </a:lvl8pPr>
-      <a:lvl9pPr marL="3886200" indent="-228600" algn="l" defTabSz="914400" rtl="0" eaLnBrk="1" latinLnBrk="0" hangingPunct="1">
+      <a:lvl9pPr marL="3303270" indent="-194310" algn="l" defTabSz="777240" rtl="0" eaLnBrk="1" latinLnBrk="0" hangingPunct="1">
         <a:lnSpc>
           <a:spcPct val="90000"/>
         </a:lnSpc>
         <a:spcBef>
-          <a:spcPts val="500"/>
+          <a:spcPts val="425"/>
         </a:spcBef>
         <a:buFont typeface="Arial" panose="020B0604020202020204" pitchFamily="34" charset="0"/>
         <a:buChar char="•"/>
-        <a:defRPr sz="1800" kern="1200">
+        <a:defRPr sz="1530" kern="1200">
           <a:solidFill>
             <a:schemeClr val="tx1"/>
           </a:solidFill>
@@ -3334,8 +2986,8 @@
       <a:defPPr>
         <a:defRPr lang="en-US"/>
       </a:defPPr>
-      <a:lvl1pPr marL="0" algn="l" defTabSz="914400" rtl="0" eaLnBrk="1" latinLnBrk="0" hangingPunct="1">
-        <a:defRPr sz="1800" kern="1200">
+      <a:lvl1pPr marL="0" algn="l" defTabSz="777240" rtl="0" eaLnBrk="1" latinLnBrk="0" hangingPunct="1">
+        <a:defRPr sz="1530" kern="1200">
           <a:solidFill>
             <a:schemeClr val="tx1"/>
           </a:solidFill>
@@ -3344,8 +2996,8 @@
           <a:cs typeface="+mn-cs"/>
         </a:defRPr>
       </a:lvl1pPr>
-      <a:lvl2pPr marL="457200" algn="l" defTabSz="914400" rtl="0" eaLnBrk="1" latinLnBrk="0" hangingPunct="1">
-        <a:defRPr sz="1800" kern="1200">
+      <a:lvl2pPr marL="388620" algn="l" defTabSz="777240" rtl="0" eaLnBrk="1" latinLnBrk="0" hangingPunct="1">
+        <a:defRPr sz="1530" kern="1200">
           <a:solidFill>
             <a:schemeClr val="tx1"/>
           </a:solidFill>
@@ -3354,8 +3006,8 @@
           <a:cs typeface="+mn-cs"/>
         </a:defRPr>
       </a:lvl2pPr>
-      <a:lvl3pPr marL="914400" algn="l" defTabSz="914400" rtl="0" eaLnBrk="1" latinLnBrk="0" hangingPunct="1">
-        <a:defRPr sz="1800" kern="1200">
+      <a:lvl3pPr marL="777240" algn="l" defTabSz="777240" rtl="0" eaLnBrk="1" latinLnBrk="0" hangingPunct="1">
+        <a:defRPr sz="1530" kern="1200">
           <a:solidFill>
             <a:schemeClr val="tx1"/>
           </a:solidFill>
@@ -3364,8 +3016,8 @@
           <a:cs typeface="+mn-cs"/>
         </a:defRPr>
       </a:lvl3pPr>
-      <a:lvl4pPr marL="1371600" algn="l" defTabSz="914400" rtl="0" eaLnBrk="1" latinLnBrk="0" hangingPunct="1">
-        <a:defRPr sz="1800" kern="1200">
+      <a:lvl4pPr marL="1165860" algn="l" defTabSz="777240" rtl="0" eaLnBrk="1" latinLnBrk="0" hangingPunct="1">
+        <a:defRPr sz="1530" kern="1200">
           <a:solidFill>
             <a:schemeClr val="tx1"/>
           </a:solidFill>
@@ -3374,8 +3026,8 @@
           <a:cs typeface="+mn-cs"/>
         </a:defRPr>
       </a:lvl4pPr>
-      <a:lvl5pPr marL="1828800" algn="l" defTabSz="914400" rtl="0" eaLnBrk="1" latinLnBrk="0" hangingPunct="1">
-        <a:defRPr sz="1800" kern="1200">
+      <a:lvl5pPr marL="1554480" algn="l" defTabSz="777240" rtl="0" eaLnBrk="1" latinLnBrk="0" hangingPunct="1">
+        <a:defRPr sz="1530" kern="1200">
           <a:solidFill>
             <a:schemeClr val="tx1"/>
           </a:solidFill>
@@ -3384,8 +3036,8 @@
           <a:cs typeface="+mn-cs"/>
         </a:defRPr>
       </a:lvl5pPr>
-      <a:lvl6pPr marL="2286000" algn="l" defTabSz="914400" rtl="0" eaLnBrk="1" latinLnBrk="0" hangingPunct="1">
-        <a:defRPr sz="1800" kern="1200">
+      <a:lvl6pPr marL="1943100" algn="l" defTabSz="777240" rtl="0" eaLnBrk="1" latinLnBrk="0" hangingPunct="1">
+        <a:defRPr sz="1530" kern="1200">
           <a:solidFill>
             <a:schemeClr val="tx1"/>
           </a:solidFill>
@@ -3394,8 +3046,8 @@
           <a:cs typeface="+mn-cs"/>
         </a:defRPr>
       </a:lvl6pPr>
-      <a:lvl7pPr marL="2743200" algn="l" defTabSz="914400" rtl="0" eaLnBrk="1" latinLnBrk="0" hangingPunct="1">
-        <a:defRPr sz="1800" kern="1200">
+      <a:lvl7pPr marL="2331720" algn="l" defTabSz="777240" rtl="0" eaLnBrk="1" latinLnBrk="0" hangingPunct="1">
+        <a:defRPr sz="1530" kern="1200">
           <a:solidFill>
             <a:schemeClr val="tx1"/>
           </a:solidFill>
@@ -3404,8 +3056,8 @@
           <a:cs typeface="+mn-cs"/>
         </a:defRPr>
       </a:lvl7pPr>
-      <a:lvl8pPr marL="3200400" algn="l" defTabSz="914400" rtl="0" eaLnBrk="1" latinLnBrk="0" hangingPunct="1">
-        <a:defRPr sz="1800" kern="1200">
+      <a:lvl8pPr marL="2720340" algn="l" defTabSz="777240" rtl="0" eaLnBrk="1" latinLnBrk="0" hangingPunct="1">
+        <a:defRPr sz="1530" kern="1200">
           <a:solidFill>
             <a:schemeClr val="tx1"/>
           </a:solidFill>
@@ -3414,8 +3066,8 @@
           <a:cs typeface="+mn-cs"/>
         </a:defRPr>
       </a:lvl8pPr>
-      <a:lvl9pPr marL="3657600" algn="l" defTabSz="914400" rtl="0" eaLnBrk="1" latinLnBrk="0" hangingPunct="1">
-        <a:defRPr sz="1800" kern="1200">
+      <a:lvl9pPr marL="3108960" algn="l" defTabSz="777240" rtl="0" eaLnBrk="1" latinLnBrk="0" hangingPunct="1">
+        <a:defRPr sz="1530" kern="1200">
           <a:solidFill>
             <a:schemeClr val="tx1"/>
           </a:solidFill>
@@ -3476,8 +3128,8 @@
         </p:blipFill>
         <p:spPr>
           <a:xfrm>
-            <a:off x="781646" y="8308496"/>
-            <a:ext cx="5417342" cy="1060416"/>
+            <a:off x="885866" y="8294693"/>
+            <a:ext cx="6139654" cy="1201805"/>
           </a:xfrm>
           <a:prstGeom prst="rect">
             <a:avLst/>
@@ -3498,8 +3150,8 @@
         </p:nvSpPr>
         <p:spPr>
           <a:xfrm>
-            <a:off x="385762" y="1876425"/>
-            <a:ext cx="6086475" cy="7629525"/>
+            <a:off x="437198" y="348916"/>
+            <a:ext cx="6898005" cy="9300410"/>
           </a:xfrm>
           <a:prstGeom prst="rect">
             <a:avLst/>
@@ -3532,7 +3184,7 @@
           <a:lstStyle/>
           <a:p>
             <a:pPr algn="ctr"/>
-            <a:endParaRPr lang="en-US"/>
+            <a:endParaRPr lang="en-US" sz="2040"/>
           </a:p>
         </p:txBody>
       </p:sp>
@@ -3550,8 +3202,8 @@
         </p:nvSpPr>
         <p:spPr>
           <a:xfrm>
-            <a:off x="530424" y="2171700"/>
-            <a:ext cx="5791793" cy="954107"/>
+            <a:off x="604185" y="572171"/>
+            <a:ext cx="6564032" cy="1068882"/>
           </a:xfrm>
           <a:prstGeom prst="rect">
             <a:avLst/>
@@ -3566,7 +3218,7 @@
           <a:p>
             <a:pPr algn="ctr"/>
             <a:r>
-              <a:rPr lang="en-US" sz="2800" b="1" dirty="0">
+              <a:rPr lang="en-US" sz="3173" b="1" dirty="0">
                 <a:solidFill>
                   <a:srgbClr val="B46929"/>
                 </a:solidFill>
@@ -3598,8 +3250,8 @@
         </p:blipFill>
         <p:spPr>
           <a:xfrm>
-            <a:off x="678656" y="4626828"/>
-            <a:ext cx="2847974" cy="2013403"/>
+            <a:off x="769143" y="3765127"/>
+            <a:ext cx="3227704" cy="2281857"/>
           </a:xfrm>
           <a:prstGeom prst="rect">
             <a:avLst/>
@@ -3625,8 +3277,8 @@
         </p:nvSpPr>
         <p:spPr>
           <a:xfrm>
-            <a:off x="3676650" y="4638139"/>
-            <a:ext cx="2645567" cy="1938992"/>
+            <a:off x="4166871" y="3717786"/>
+            <a:ext cx="2998309" cy="2185598"/>
           </a:xfrm>
           <a:prstGeom prst="rect">
             <a:avLst/>
@@ -3639,12 +3291,12 @@
           </a:bodyPr>
           <a:lstStyle/>
           <a:p>
-            <a:pPr marL="171450" indent="-171450">
+            <a:pPr marL="194304" indent="-194304">
               <a:buFont typeface="Arial" panose="020B0604020202020204" pitchFamily="34" charset="0"/>
               <a:buChar char="•"/>
             </a:pPr>
             <a:r>
-              <a:rPr lang="en-US" sz="2000" b="1" dirty="0">
+              <a:rPr lang="en-US" sz="2267" b="1" dirty="0">
                 <a:solidFill>
                   <a:srgbClr val="B46929"/>
                 </a:solidFill>
@@ -3653,12 +3305,12 @@
             </a:r>
           </a:p>
           <a:p>
-            <a:pPr marL="171450" indent="-171450">
+            <a:pPr marL="194304" indent="-194304">
               <a:buFont typeface="Arial" panose="020B0604020202020204" pitchFamily="34" charset="0"/>
               <a:buChar char="•"/>
             </a:pPr>
             <a:r>
-              <a:rPr lang="en-US" sz="2000" b="1" dirty="0">
+              <a:rPr lang="en-US" sz="2267" b="1" dirty="0">
                 <a:solidFill>
                   <a:srgbClr val="B46929"/>
                 </a:solidFill>
@@ -3667,12 +3319,12 @@
             </a:r>
           </a:p>
           <a:p>
-            <a:pPr marL="171450" indent="-171450">
+            <a:pPr marL="194304" indent="-194304">
               <a:buFont typeface="Arial" panose="020B0604020202020204" pitchFamily="34" charset="0"/>
               <a:buChar char="•"/>
             </a:pPr>
             <a:r>
-              <a:rPr lang="en-US" sz="2000" b="1" dirty="0">
+              <a:rPr lang="en-US" sz="2267" b="1" dirty="0">
                 <a:solidFill>
                   <a:srgbClr val="B46929"/>
                 </a:solidFill>
@@ -3681,12 +3333,12 @@
             </a:r>
           </a:p>
           <a:p>
-            <a:pPr marL="171450" indent="-171450">
+            <a:pPr marL="194304" indent="-194304">
               <a:buFont typeface="Arial" panose="020B0604020202020204" pitchFamily="34" charset="0"/>
               <a:buChar char="•"/>
             </a:pPr>
             <a:r>
-              <a:rPr lang="en-US" sz="2000" b="1" dirty="0">
+              <a:rPr lang="en-US" sz="2267" b="1" dirty="0">
                 <a:solidFill>
                   <a:srgbClr val="B46929"/>
                 </a:solidFill>
@@ -3710,8 +3362,8 @@
         </p:nvSpPr>
         <p:spPr>
           <a:xfrm>
-            <a:off x="781646" y="6741431"/>
-            <a:ext cx="2739280" cy="1384995"/>
+            <a:off x="885866" y="6340185"/>
+            <a:ext cx="3104517" cy="1557734"/>
           </a:xfrm>
           <a:prstGeom prst="rect">
             <a:avLst/>
@@ -3724,19 +3376,19 @@
           </a:bodyPr>
           <a:lstStyle/>
           <a:p>
-            <a:pPr marL="171450" indent="-171450"/>
-            <a:r>
-              <a:rPr lang="en-US" b="1" dirty="0"/>
+            <a:pPr marL="194304" indent="-194304"/>
+            <a:r>
+              <a:rPr lang="en-US" sz="2040" b="1" dirty="0"/>
               <a:t>CONTACT</a:t>
             </a:r>
           </a:p>
           <a:p>
-            <a:pPr marL="171450" indent="-171450">
+            <a:pPr marL="194304" indent="-194304">
               <a:buFont typeface="Arial" panose="020B0604020202020204" pitchFamily="34" charset="0"/>
               <a:buChar char="•"/>
             </a:pPr>
             <a:r>
-              <a:rPr lang="en-US" sz="1100" b="1" dirty="0">
+              <a:rPr lang="en-US" sz="1247" b="1" dirty="0">
                 <a:solidFill>
                   <a:srgbClr val="B46929"/>
                 </a:solidFill>
@@ -3744,7 +3396,7 @@
               <a:t>Anabelle Myers</a:t>
             </a:r>
             <a:r>
-              <a:rPr lang="en-US" sz="1100" dirty="0">
+              <a:rPr lang="en-US" sz="1247" dirty="0">
                 <a:solidFill>
                   <a:srgbClr val="B46929"/>
                 </a:solidFill>
@@ -3752,7 +3404,7 @@
               <a:t>: </a:t>
             </a:r>
             <a:r>
-              <a:rPr lang="en-US" sz="1100" dirty="0">
+              <a:rPr lang="en-US" sz="1247" dirty="0">
                 <a:solidFill>
                   <a:srgbClr val="B46929"/>
                 </a:solidFill>
@@ -3767,7 +3419,7 @@
               <a:t>a02369941@usu.edu</a:t>
             </a:r>
             <a:r>
-              <a:rPr lang="en-US" sz="1100" dirty="0">
+              <a:rPr lang="en-US" sz="1247" dirty="0">
                 <a:solidFill>
                   <a:srgbClr val="B46929"/>
                 </a:solidFill>
@@ -3776,12 +3428,12 @@
             </a:r>
           </a:p>
           <a:p>
-            <a:pPr marL="171450" indent="-171450">
+            <a:pPr marL="194304" indent="-194304">
               <a:buFont typeface="Arial" panose="020B0604020202020204" pitchFamily="34" charset="0"/>
               <a:buChar char="•"/>
             </a:pPr>
             <a:r>
-              <a:rPr lang="en-US" sz="1100" b="1" dirty="0">
+              <a:rPr lang="en-US" sz="1247" b="1" dirty="0">
                 <a:solidFill>
                   <a:srgbClr val="B46929"/>
                 </a:solidFill>
@@ -3789,7 +3441,7 @@
               <a:t>David Rosenberg</a:t>
             </a:r>
             <a:r>
-              <a:rPr lang="en-US" sz="1100" dirty="0">
+              <a:rPr lang="en-US" sz="1247" dirty="0">
                 <a:solidFill>
                   <a:srgbClr val="B46929"/>
                 </a:solidFill>
@@ -3797,7 +3449,7 @@
               <a:t>: </a:t>
             </a:r>
             <a:r>
-              <a:rPr lang="en-US" sz="1100" dirty="0">
+              <a:rPr lang="en-US" sz="1247" dirty="0">
                 <a:solidFill>
                   <a:srgbClr val="B46929"/>
                 </a:solidFill>
@@ -3806,21 +3458,32 @@
               <a:t>david.rosenberg@usu.edu</a:t>
             </a:r>
             <a:r>
-              <a:rPr lang="en-US" sz="1100" dirty="0">
+              <a:rPr lang="en-US" sz="1247" dirty="0">
                 <a:solidFill>
                   <a:srgbClr val="B46929"/>
                 </a:solidFill>
               </a:rPr>
-              <a:t>,                 435-797-8689</a:t>
-            </a:r>
-          </a:p>
-          <a:p>
-            <a:pPr marL="171450" indent="-171450">
+              <a:t>, </a:t>
+            </a:r>
+          </a:p>
+          <a:p>
+            <a:pPr marL="168275" indent="-168275"/>
+            <a:r>
+              <a:rPr lang="en-US" sz="1247" dirty="0">
+                <a:solidFill>
+                  <a:srgbClr val="B46929"/>
+                </a:solidFill>
+              </a:rPr>
+              <a:t>	435-797-8689</a:t>
+            </a:r>
+          </a:p>
+          <a:p>
+            <a:pPr marL="194304" indent="-194304">
               <a:buFont typeface="Arial" panose="020B0604020202020204" pitchFamily="34" charset="0"/>
               <a:buChar char="•"/>
             </a:pPr>
             <a:r>
-              <a:rPr lang="en-US" sz="1100" dirty="0">
+              <a:rPr lang="en-US" sz="1247" dirty="0">
                 <a:solidFill>
                   <a:srgbClr val="B46929"/>
                 </a:solidFill>
@@ -3844,8 +3507,8 @@
         </p:nvSpPr>
         <p:spPr>
           <a:xfrm>
-            <a:off x="653058" y="3279448"/>
-            <a:ext cx="5674518" cy="1200329"/>
+            <a:off x="670640" y="1827619"/>
+            <a:ext cx="6431120" cy="1661993"/>
           </a:xfrm>
           <a:prstGeom prst="rect">
             <a:avLst/>
@@ -3858,33 +3521,33 @@
           </a:bodyPr>
           <a:lstStyle/>
           <a:p>
-            <a:pPr marL="285750" indent="-285750">
+            <a:pPr marL="323840" indent="-323840">
               <a:buFont typeface="Arial" panose="020B0604020202020204" pitchFamily="34" charset="0"/>
               <a:buChar char="•"/>
             </a:pPr>
             <a:r>
-              <a:rPr lang="en-US" dirty="0"/>
-              <a:t>Join an immersive online model session.</a:t>
-            </a:r>
-          </a:p>
-          <a:p>
-            <a:pPr marL="285750" indent="-285750">
+              <a:rPr lang="en-US" sz="2040" dirty="0"/>
+              <a:t>Adapt strategies with extreme low inflow and storage.</a:t>
+            </a:r>
+          </a:p>
+          <a:p>
+            <a:pPr marL="323840" indent="-323840">
               <a:buFont typeface="Arial" panose="020B0604020202020204" pitchFamily="34" charset="0"/>
               <a:buChar char="•"/>
             </a:pPr>
             <a:r>
-              <a:rPr lang="en-US" dirty="0"/>
-              <a:t>Adapt strategies with extreme low inflow and storage.</a:t>
-            </a:r>
-          </a:p>
-          <a:p>
-            <a:pPr marL="285750" indent="-285750">
+              <a:rPr lang="en-US" sz="2040" dirty="0"/>
+              <a:t>Give users more autonomy and flexibility to manage their differing interests.</a:t>
+            </a:r>
+          </a:p>
+          <a:p>
+            <a:pPr marL="323840" indent="-323840">
               <a:buFont typeface="Arial" panose="020B0604020202020204" pitchFamily="34" charset="0"/>
               <a:buChar char="•"/>
             </a:pPr>
             <a:r>
-              <a:rPr lang="en-US" dirty="0"/>
-              <a:t>Give users more autonomy and flexibility to manage their differing interests.</a:t>
+              <a:rPr lang="en-US" sz="2040" dirty="0"/>
+              <a:t>Join an immersive online collaborative model session.</a:t>
             </a:r>
           </a:p>
         </p:txBody>
@@ -3903,8 +3566,8 @@
         </p:nvSpPr>
         <p:spPr>
           <a:xfrm>
-            <a:off x="3676650" y="6741431"/>
-            <a:ext cx="2276475" cy="1754326"/>
+            <a:off x="4166871" y="6340184"/>
+            <a:ext cx="2580005" cy="1975926"/>
           </a:xfrm>
           <a:prstGeom prst="rect">
             <a:avLst/>
@@ -3917,48 +3580,48 @@
           </a:bodyPr>
           <a:lstStyle/>
           <a:p>
-            <a:pPr marL="171450" indent="-171450" algn="ctr"/>
-            <a:r>
-              <a:rPr lang="en-US" b="1" dirty="0"/>
+            <a:pPr marL="194304" indent="-194304" algn="ctr"/>
+            <a:r>
+              <a:rPr lang="en-US" sz="2040" b="1" dirty="0"/>
               <a:t>OUR RECENT WORK</a:t>
             </a:r>
           </a:p>
           <a:p>
-            <a:pPr marL="171450" indent="-171450" algn="ctr"/>
-            <a:endParaRPr lang="en-US" b="1" dirty="0">
+            <a:pPr marL="194304" indent="-194304" algn="ctr"/>
+            <a:endParaRPr lang="en-US" sz="2040" b="1" dirty="0">
               <a:solidFill>
                 <a:srgbClr val="B46929"/>
               </a:solidFill>
             </a:endParaRPr>
           </a:p>
           <a:p>
-            <a:pPr marL="171450" indent="-171450" algn="ctr"/>
-            <a:endParaRPr lang="en-US" b="1" dirty="0">
+            <a:pPr marL="194304" indent="-194304" algn="ctr"/>
+            <a:endParaRPr lang="en-US" sz="2040" b="1" dirty="0">
               <a:solidFill>
                 <a:srgbClr val="B46929"/>
               </a:solidFill>
             </a:endParaRPr>
           </a:p>
           <a:p>
-            <a:pPr marL="171450" indent="-171450" algn="ctr"/>
-            <a:endParaRPr lang="en-US" b="1" dirty="0">
+            <a:pPr marL="194304" indent="-194304" algn="ctr"/>
+            <a:endParaRPr lang="en-US" sz="2040" b="1" dirty="0">
               <a:solidFill>
                 <a:srgbClr val="B46929"/>
               </a:solidFill>
             </a:endParaRPr>
           </a:p>
           <a:p>
-            <a:pPr marL="171450" indent="-171450" algn="ctr"/>
-            <a:endParaRPr lang="en-US" b="1" dirty="0">
+            <a:pPr marL="194304" indent="-194304" algn="ctr"/>
+            <a:endParaRPr lang="en-US" sz="2040" b="1" dirty="0">
               <a:solidFill>
                 <a:srgbClr val="B46929"/>
               </a:solidFill>
             </a:endParaRPr>
           </a:p>
           <a:p>
-            <a:pPr marL="171450" indent="-171450" algn="ctr"/>
-            <a:r>
-              <a:rPr lang="en-US" b="1" dirty="0">
+            <a:pPr marL="194304" indent="-194304" algn="ctr"/>
+            <a:r>
+              <a:rPr lang="en-US" sz="2040" b="1" dirty="0">
                 <a:solidFill>
                   <a:srgbClr val="B46929"/>
                 </a:solidFill>
@@ -3990,8 +3653,8 @@
         </p:blipFill>
         <p:spPr>
           <a:xfrm>
-            <a:off x="4289964" y="7100759"/>
-            <a:ext cx="1049847" cy="1060416"/>
+            <a:off x="4861960" y="6747423"/>
+            <a:ext cx="1189827" cy="1201805"/>
           </a:xfrm>
           <a:prstGeom prst="rect">
             <a:avLst/>
@@ -4014,7 +3677,7 @@
 <file path=ppt/theme/theme1.xml><?xml version="1.0" encoding="utf-8"?>
 <a:theme xmlns:a="http://schemas.openxmlformats.org/drawingml/2006/main" name="Office Theme">
   <a:themeElements>
-    <a:clrScheme name="Office">
+    <a:clrScheme name="Office Theme">
       <a:dk1>
         <a:sysClr val="windowText" lastClr="000000"/>
       </a:dk1>
@@ -4052,7 +3715,7 @@
         <a:srgbClr val="96607D"/>
       </a:folHlink>
     </a:clrScheme>
-    <a:fontScheme name="Office">
+    <a:fontScheme name="Office Theme">
       <a:majorFont>
         <a:latin typeface="Aptos Display" panose="02110004020202020204"/>
         <a:ea typeface=""/>
@@ -4158,7 +3821,7 @@
         <a:font script="Tfng" typeface="Ebrima"/>
       </a:minorFont>
     </a:fontScheme>
-    <a:fmtScheme name="Office">
+    <a:fmtScheme name="Office Theme">
       <a:fillStyleLst>
         <a:solidFill>
           <a:schemeClr val="phClr"/>

</xml_diff>